<commit_message>
update P3140 slides for St. Louis
</commit_message>
<xml_diff>
--- a/slides/p3140-slides.pptx
+++ b/slides/p3140-slides.pptx
@@ -5,7 +5,7 @@
     <p:sldMasterId id="2147483648" r:id="rId1"/>
   </p:sldMasterIdLst>
   <p:notesMasterIdLst>
-    <p:notesMasterId r:id="rId14"/>
+    <p:notesMasterId r:id="rId15"/>
   </p:notesMasterIdLst>
   <p:sldIdLst>
     <p:sldId id="256" r:id="rId2"/>
@@ -19,7 +19,8 @@
     <p:sldId id="265" r:id="rId10"/>
     <p:sldId id="264" r:id="rId11"/>
     <p:sldId id="262" r:id="rId12"/>
-    <p:sldId id="266" r:id="rId13"/>
+    <p:sldId id="268" r:id="rId13"/>
+    <p:sldId id="266" r:id="rId14"/>
   </p:sldIdLst>
   <p:sldSz cx="12192000" cy="6858000"/>
   <p:notesSz cx="6858000" cy="9144000"/>
@@ -208,7 +209,7 @@
           <a:p>
             <a:fld id="{CD962821-9FDB-4417-B8B3-21108CBE3224}" type="datetimeFigureOut">
               <a:rPr lang="en-DE" smtClean="0"/>
-              <a:t>03/20/2024</a:t>
+              <a:t>27/06/2024</a:t>
             </a:fld>
             <a:endParaRPr lang="en-DE"/>
           </a:p>
@@ -625,7 +626,7 @@
           <a:p>
             <a:fld id="{71B2745E-CC1F-4D8C-AB14-713BDEDCFEEB}" type="datetime8">
               <a:rPr lang="en-DE" smtClean="0"/>
-              <a:t>03/20/2024 22:17</a:t>
+              <a:t>27/06/2024 16:29</a:t>
             </a:fld>
             <a:endParaRPr lang="en-DE"/>
           </a:p>
@@ -825,7 +826,7 @@
           <a:p>
             <a:fld id="{5CFB80E4-33E7-4BD8-A1D1-C1E453B36FBE}" type="datetime8">
               <a:rPr lang="en-DE" smtClean="0"/>
-              <a:t>03/20/2024 22:17</a:t>
+              <a:t>27/06/2024 16:29</a:t>
             </a:fld>
             <a:endParaRPr lang="en-DE"/>
           </a:p>
@@ -1035,7 +1036,7 @@
           <a:p>
             <a:fld id="{35606A28-1F59-4FFB-92CF-CE623345F9DB}" type="datetime8">
               <a:rPr lang="en-DE" smtClean="0"/>
-              <a:t>03/20/2024 22:17</a:t>
+              <a:t>27/06/2024 16:29</a:t>
             </a:fld>
             <a:endParaRPr lang="en-DE"/>
           </a:p>
@@ -1235,7 +1236,7 @@
           <a:p>
             <a:fld id="{0EB0A135-D190-4BD9-B150-64BA07FEF37B}" type="datetime8">
               <a:rPr lang="en-DE" smtClean="0"/>
-              <a:t>03/20/2024 22:17</a:t>
+              <a:t>27/06/2024 16:29</a:t>
             </a:fld>
             <a:endParaRPr lang="en-DE"/>
           </a:p>
@@ -1511,7 +1512,7 @@
           <a:p>
             <a:fld id="{75EECE1D-6A5B-488C-96F4-3F018FB6CB1F}" type="datetime8">
               <a:rPr lang="en-DE" smtClean="0"/>
-              <a:t>03/20/2024 22:17</a:t>
+              <a:t>27/06/2024 16:29</a:t>
             </a:fld>
             <a:endParaRPr lang="en-DE"/>
           </a:p>
@@ -1779,7 +1780,7 @@
           <a:p>
             <a:fld id="{E994E17E-FE36-4AAC-B6F4-3A0FEB106346}" type="datetime8">
               <a:rPr lang="en-DE" smtClean="0"/>
-              <a:t>03/20/2024 22:17</a:t>
+              <a:t>27/06/2024 16:29</a:t>
             </a:fld>
             <a:endParaRPr lang="en-DE"/>
           </a:p>
@@ -2194,7 +2195,7 @@
           <a:p>
             <a:fld id="{A1274BE2-97CD-40A0-B6BF-437A9B3728FF}" type="datetime8">
               <a:rPr lang="en-DE" smtClean="0"/>
-              <a:t>03/20/2024 22:17</a:t>
+              <a:t>27/06/2024 16:29</a:t>
             </a:fld>
             <a:endParaRPr lang="en-DE"/>
           </a:p>
@@ -2336,7 +2337,7 @@
           <a:p>
             <a:fld id="{BED03E48-4668-48E3-8E08-D6EF6EFD458C}" type="datetime8">
               <a:rPr lang="en-DE" smtClean="0"/>
-              <a:t>03/20/2024 22:17</a:t>
+              <a:t>27/06/2024 16:29</a:t>
             </a:fld>
             <a:endParaRPr lang="en-DE"/>
           </a:p>
@@ -2449,7 +2450,7 @@
           <a:p>
             <a:fld id="{C01F1FF6-23CE-41F2-98FA-82F1523C33FE}" type="datetime8">
               <a:rPr lang="en-DE" smtClean="0"/>
-              <a:t>03/20/2024 22:17</a:t>
+              <a:t>27/06/2024 16:29</a:t>
             </a:fld>
             <a:endParaRPr lang="en-DE"/>
           </a:p>
@@ -2762,7 +2763,7 @@
           <a:p>
             <a:fld id="{DE10CF8B-005B-45A0-8527-E3C8A79F5D7D}" type="datetime8">
               <a:rPr lang="en-DE" smtClean="0"/>
-              <a:t>03/20/2024 22:17</a:t>
+              <a:t>27/06/2024 16:29</a:t>
             </a:fld>
             <a:endParaRPr lang="en-DE"/>
           </a:p>
@@ -3051,7 +3052,7 @@
           <a:p>
             <a:fld id="{05D82414-ECD0-4D1E-890D-FA17C5DB1788}" type="datetime8">
               <a:rPr lang="en-DE" smtClean="0"/>
-              <a:t>03/20/2024 22:17</a:t>
+              <a:t>27/06/2024 16:29</a:t>
             </a:fld>
             <a:endParaRPr lang="en-DE"/>
           </a:p>
@@ -3294,7 +3295,7 @@
           <a:p>
             <a:fld id="{2434BD09-B586-496D-A7C7-4A6458ECB1EF}" type="datetime8">
               <a:rPr lang="en-DE" smtClean="0"/>
-              <a:t>03/20/2024 22:17</a:t>
+              <a:t>27/06/2024 16:29</a:t>
             </a:fld>
             <a:endParaRPr lang="en-DE"/>
           </a:p>
@@ -3906,7 +3907,7 @@
                   </a:schemeClr>
                 </a:solidFill>
               </a:rPr>
-              <a:t>P3140</a:t>
+              <a:t>P3140R0</a:t>
             </a:r>
             <a:endParaRPr lang="de-DE" sz="4800" b="1">
               <a:solidFill>
@@ -3941,8 +3942,8 @@
         </p:nvSpPr>
         <p:spPr>
           <a:xfrm>
-            <a:off x="8989512" y="4234208"/>
-            <a:ext cx="3581400" cy="769441"/>
+            <a:off x="8181975" y="3103463"/>
+            <a:ext cx="3581400" cy="1446550"/>
           </a:xfrm>
           <a:prstGeom prst="rect">
             <a:avLst/>
@@ -3955,13 +3956,25 @@
           </a:bodyPr>
           <a:lstStyle/>
           <a:p>
+            <a:pPr algn="r"/>
             <a:r>
               <a:rPr lang="de-DE" sz="4400" b="1">
                 <a:solidFill>
                   <a:srgbClr val="FABCCF"/>
                 </a:solidFill>
               </a:rPr>
-              <a:t>Tokyo 2024</a:t>
+              <a:t>St. Louis</a:t>
+            </a:r>
+          </a:p>
+          <a:p>
+            <a:pPr algn="r"/>
+            <a:r>
+              <a:rPr lang="de-DE" sz="4400" b="1">
+                <a:solidFill>
+                  <a:srgbClr val="FABCCF"/>
+                </a:solidFill>
+              </a:rPr>
+              <a:t>2024</a:t>
             </a:r>
             <a:endParaRPr lang="en-DE" sz="4400" b="1">
               <a:solidFill>
@@ -3973,49 +3986,6 @@
       </p:sp>
       <p:sp>
         <p:nvSpPr>
-          <p:cNvPr id="8" name="Textfeld 7">
-            <a:extLst>
-              <a:ext uri="{FF2B5EF4-FFF2-40B4-BE49-F238E27FC236}">
-                <a16:creationId xmlns:a16="http://schemas.microsoft.com/office/drawing/2014/main" id="{951C9DE6-4285-3749-75C0-22CBC489D4E2}"/>
-              </a:ext>
-            </a:extLst>
-          </p:cNvPr>
-          <p:cNvSpPr txBox="1"/>
-          <p:nvPr/>
-        </p:nvSpPr>
-        <p:spPr>
-          <a:xfrm>
-            <a:off x="8859667" y="4762425"/>
-            <a:ext cx="4208633" cy="1938992"/>
-          </a:xfrm>
-          <a:prstGeom prst="rect">
-            <a:avLst/>
-          </a:prstGeom>
-        </p:spPr>
-        <p:txBody>
-          <a:bodyPr wrap="square" rtlCol="0">
-            <a:spAutoFit/>
-          </a:bodyPr>
-          <a:lstStyle/>
-          <a:p>
-            <a:r>
-              <a:rPr lang="ja-JP" altLang="en-US" sz="12000" b="1">
-                <a:solidFill>
-                  <a:srgbClr val="FABCCF"/>
-                </a:solidFill>
-              </a:rPr>
-              <a:t>東京</a:t>
-            </a:r>
-            <a:endParaRPr lang="en-DE" sz="12000" b="1">
-              <a:solidFill>
-                <a:srgbClr val="FABCCF"/>
-              </a:solidFill>
-            </a:endParaRPr>
-          </a:p>
-        </p:txBody>
-      </p:sp>
-      <p:sp>
-        <p:nvSpPr>
           <p:cNvPr id="11" name="Textfeld 10">
             <a:extLst>
               <a:ext uri="{FF2B5EF4-FFF2-40B4-BE49-F238E27FC236}">
@@ -4068,7 +4038,7 @@
             </a:r>
             <a:r>
               <a:rPr lang="de-DE"/>
-              <a:t>:    SG17, SG18</a:t>
+              <a:t>:    EWG</a:t>
             </a:r>
           </a:p>
           <a:p>
@@ -4094,6 +4064,45 @@
           </a:p>
         </p:txBody>
       </p:sp>
+      <p:pic>
+        <p:nvPicPr>
+          <p:cNvPr id="3" name="Graphic 2">
+            <a:extLst>
+              <a:ext uri="{FF2B5EF4-FFF2-40B4-BE49-F238E27FC236}">
+                <a16:creationId xmlns:a16="http://schemas.microsoft.com/office/drawing/2014/main" id="{295243CC-BFB4-23DE-CB48-89F31302FAFC}"/>
+              </a:ext>
+            </a:extLst>
+          </p:cNvPr>
+          <p:cNvPicPr>
+            <a:picLocks noChangeAspect="1"/>
+          </p:cNvPicPr>
+          <p:nvPr/>
+        </p:nvPicPr>
+        <p:blipFill>
+          <a:blip r:embed="rId2">
+            <a:extLst>
+              <a:ext uri="{28A0092B-C50C-407E-A947-70E740481C1C}">
+                <a14:useLocalDpi xmlns:a14="http://schemas.microsoft.com/office/drawing/2010/main" val="0"/>
+              </a:ext>
+              <a:ext uri="{96DAC541-7B7A-43D3-8B79-37D633B846F1}">
+                <asvg:svgBlip xmlns:asvg="http://schemas.microsoft.com/office/drawing/2016/SVG/main" r:embed="rId3"/>
+              </a:ext>
+            </a:extLst>
+          </a:blip>
+          <a:stretch>
+            <a:fillRect/>
+          </a:stretch>
+        </p:blipFill>
+        <p:spPr>
+          <a:xfrm>
+            <a:off x="7394805" y="4392343"/>
+            <a:ext cx="4644795" cy="2764564"/>
+          </a:xfrm>
+          <a:prstGeom prst="rect">
+            <a:avLst/>
+          </a:prstGeom>
+        </p:spPr>
+      </p:pic>
     </p:spTree>
     <p:extLst>
       <p:ext uri="{BB962C8B-B14F-4D97-AF65-F5344CB8AC3E}">
@@ -4338,92 +4347,6 @@
       </p:sp>
       <p:sp>
         <p:nvSpPr>
-          <p:cNvPr id="8" name="Textfeld 7">
-            <a:extLst>
-              <a:ext uri="{FF2B5EF4-FFF2-40B4-BE49-F238E27FC236}">
-                <a16:creationId xmlns:a16="http://schemas.microsoft.com/office/drawing/2014/main" id="{2687DB21-E114-1E4F-29AB-B2D599072FFF}"/>
-              </a:ext>
-            </a:extLst>
-          </p:cNvPr>
-          <p:cNvSpPr txBox="1"/>
-          <p:nvPr/>
-        </p:nvSpPr>
-        <p:spPr>
-          <a:xfrm>
-            <a:off x="10835014" y="6180478"/>
-            <a:ext cx="1356986" cy="769441"/>
-          </a:xfrm>
-          <a:prstGeom prst="rect">
-            <a:avLst/>
-          </a:prstGeom>
-          <a:noFill/>
-        </p:spPr>
-        <p:txBody>
-          <a:bodyPr wrap="square" anchor="ctr" anchorCtr="0">
-            <a:spAutoFit/>
-          </a:bodyPr>
-          <a:lstStyle/>
-          <a:p>
-            <a:pPr algn="r"/>
-            <a:r>
-              <a:rPr lang="ja-JP" altLang="en-US" sz="4400" b="1">
-                <a:solidFill>
-                  <a:srgbClr val="FABCCF"/>
-                </a:solidFill>
-              </a:rPr>
-              <a:t>東京</a:t>
-            </a:r>
-            <a:endParaRPr lang="en-DE" sz="4400" b="1">
-              <a:solidFill>
-                <a:srgbClr val="FABCCF"/>
-              </a:solidFill>
-            </a:endParaRPr>
-          </a:p>
-        </p:txBody>
-      </p:sp>
-      <p:sp>
-        <p:nvSpPr>
-          <p:cNvPr id="10" name="Textfeld 9">
-            <a:extLst>
-              <a:ext uri="{FF2B5EF4-FFF2-40B4-BE49-F238E27FC236}">
-                <a16:creationId xmlns:a16="http://schemas.microsoft.com/office/drawing/2014/main" id="{8A77F318-31B1-26EF-32FC-6C3A9FF3EE2F}"/>
-              </a:ext>
-            </a:extLst>
-          </p:cNvPr>
-          <p:cNvSpPr txBox="1"/>
-          <p:nvPr/>
-        </p:nvSpPr>
-        <p:spPr>
-          <a:xfrm>
-            <a:off x="9602648" y="6283492"/>
-            <a:ext cx="1453018" cy="523220"/>
-          </a:xfrm>
-          <a:prstGeom prst="rect">
-            <a:avLst/>
-          </a:prstGeom>
-          <a:noFill/>
-        </p:spPr>
-        <p:txBody>
-          <a:bodyPr wrap="square">
-            <a:spAutoFit/>
-          </a:bodyPr>
-          <a:lstStyle/>
-          <a:p>
-            <a:pPr algn="r"/>
-            <a:r>
-              <a:rPr lang="de-DE" altLang="ja-JP" sz="2800" b="1">
-                <a:solidFill>
-                  <a:srgbClr val="FABCCF"/>
-                </a:solidFill>
-              </a:rPr>
-              <a:t>2024</a:t>
-            </a:r>
-            <a:endParaRPr lang="en-DE" sz="2800"/>
-          </a:p>
-        </p:txBody>
-      </p:sp>
-      <p:sp>
-        <p:nvSpPr>
           <p:cNvPr id="11" name="Foliennummernplatzhalter 10">
             <a:extLst>
               <a:ext uri="{FF2B5EF4-FFF2-40B4-BE49-F238E27FC236}">
@@ -4942,10 +4865,10 @@
       </p:sp>
       <p:pic>
         <p:nvPicPr>
-          <p:cNvPr id="3" name="Graphic 2">
-            <a:extLst>
-              <a:ext uri="{FF2B5EF4-FFF2-40B4-BE49-F238E27FC236}">
-                <a16:creationId xmlns:a16="http://schemas.microsoft.com/office/drawing/2014/main" id="{DBDFCB48-6DA9-4924-8392-60BB20D46DA8}"/>
+          <p:cNvPr id="2" name="Graphic 1">
+            <a:extLst>
+              <a:ext uri="{FF2B5EF4-FFF2-40B4-BE49-F238E27FC236}">
+                <a16:creationId xmlns:a16="http://schemas.microsoft.com/office/drawing/2014/main" id="{0C0093EE-A7BE-AE1B-2AF5-5D020D094399}"/>
               </a:ext>
             </a:extLst>
           </p:cNvPr>
@@ -4971,14 +4894,55 @@
         </p:blipFill>
         <p:spPr>
           <a:xfrm>
-            <a:off x="10989355" y="5195799"/>
-            <a:ext cx="1048303" cy="1048303"/>
+            <a:off x="10207148" y="5267770"/>
+            <a:ext cx="1781182" cy="1060153"/>
           </a:xfrm>
           <a:prstGeom prst="rect">
             <a:avLst/>
           </a:prstGeom>
         </p:spPr>
       </p:pic>
+      <p:sp>
+        <p:nvSpPr>
+          <p:cNvPr id="7" name="Textfeld 9">
+            <a:extLst>
+              <a:ext uri="{FF2B5EF4-FFF2-40B4-BE49-F238E27FC236}">
+                <a16:creationId xmlns:a16="http://schemas.microsoft.com/office/drawing/2014/main" id="{A96309E0-53AF-38EC-A2B2-949C5520BD87}"/>
+              </a:ext>
+            </a:extLst>
+          </p:cNvPr>
+          <p:cNvSpPr txBox="1"/>
+          <p:nvPr/>
+        </p:nvSpPr>
+        <p:spPr>
+          <a:xfrm>
+            <a:off x="9602648" y="6283492"/>
+            <a:ext cx="2589352" cy="461665"/>
+          </a:xfrm>
+          <a:prstGeom prst="rect">
+            <a:avLst/>
+          </a:prstGeom>
+          <a:noFill/>
+        </p:spPr>
+        <p:txBody>
+          <a:bodyPr wrap="square">
+            <a:spAutoFit/>
+          </a:bodyPr>
+          <a:lstStyle/>
+          <a:p>
+            <a:pPr algn="r"/>
+            <a:r>
+              <a:rPr lang="de-DE" altLang="ja-JP" sz="2400" b="1">
+                <a:solidFill>
+                  <a:srgbClr val="FABCCF"/>
+                </a:solidFill>
+              </a:rPr>
+              <a:t>ST. LOUIS 2024</a:t>
+            </a:r>
+            <a:endParaRPr lang="en-DE" sz="2400"/>
+          </a:p>
+        </p:txBody>
+      </p:sp>
     </p:spTree>
     <p:extLst>
       <p:ext uri="{BB962C8B-B14F-4D97-AF65-F5344CB8AC3E}">
@@ -5223,92 +5187,6 @@
       </p:sp>
       <p:sp>
         <p:nvSpPr>
-          <p:cNvPr id="8" name="Textfeld 7">
-            <a:extLst>
-              <a:ext uri="{FF2B5EF4-FFF2-40B4-BE49-F238E27FC236}">
-                <a16:creationId xmlns:a16="http://schemas.microsoft.com/office/drawing/2014/main" id="{2687DB21-E114-1E4F-29AB-B2D599072FFF}"/>
-              </a:ext>
-            </a:extLst>
-          </p:cNvPr>
-          <p:cNvSpPr txBox="1"/>
-          <p:nvPr/>
-        </p:nvSpPr>
-        <p:spPr>
-          <a:xfrm>
-            <a:off x="10835014" y="6180478"/>
-            <a:ext cx="1356986" cy="769441"/>
-          </a:xfrm>
-          <a:prstGeom prst="rect">
-            <a:avLst/>
-          </a:prstGeom>
-          <a:noFill/>
-        </p:spPr>
-        <p:txBody>
-          <a:bodyPr wrap="square" anchor="ctr" anchorCtr="0">
-            <a:spAutoFit/>
-          </a:bodyPr>
-          <a:lstStyle/>
-          <a:p>
-            <a:pPr algn="r"/>
-            <a:r>
-              <a:rPr lang="ja-JP" altLang="en-US" sz="4400" b="1">
-                <a:solidFill>
-                  <a:srgbClr val="FABCCF"/>
-                </a:solidFill>
-              </a:rPr>
-              <a:t>東京</a:t>
-            </a:r>
-            <a:endParaRPr lang="en-DE" sz="4400" b="1">
-              <a:solidFill>
-                <a:srgbClr val="FABCCF"/>
-              </a:solidFill>
-            </a:endParaRPr>
-          </a:p>
-        </p:txBody>
-      </p:sp>
-      <p:sp>
-        <p:nvSpPr>
-          <p:cNvPr id="10" name="Textfeld 9">
-            <a:extLst>
-              <a:ext uri="{FF2B5EF4-FFF2-40B4-BE49-F238E27FC236}">
-                <a16:creationId xmlns:a16="http://schemas.microsoft.com/office/drawing/2014/main" id="{8A77F318-31B1-26EF-32FC-6C3A9FF3EE2F}"/>
-              </a:ext>
-            </a:extLst>
-          </p:cNvPr>
-          <p:cNvSpPr txBox="1"/>
-          <p:nvPr/>
-        </p:nvSpPr>
-        <p:spPr>
-          <a:xfrm>
-            <a:off x="9602648" y="6283492"/>
-            <a:ext cx="1453018" cy="523220"/>
-          </a:xfrm>
-          <a:prstGeom prst="rect">
-            <a:avLst/>
-          </a:prstGeom>
-          <a:noFill/>
-        </p:spPr>
-        <p:txBody>
-          <a:bodyPr wrap="square">
-            <a:spAutoFit/>
-          </a:bodyPr>
-          <a:lstStyle/>
-          <a:p>
-            <a:pPr algn="r"/>
-            <a:r>
-              <a:rPr lang="de-DE" altLang="ja-JP" sz="2800" b="1">
-                <a:solidFill>
-                  <a:srgbClr val="FABCCF"/>
-                </a:solidFill>
-              </a:rPr>
-              <a:t>2024</a:t>
-            </a:r>
-            <a:endParaRPr lang="en-DE" sz="2800"/>
-          </a:p>
-        </p:txBody>
-      </p:sp>
-      <p:sp>
-        <p:nvSpPr>
           <p:cNvPr id="11" name="Foliennummernplatzhalter 10">
             <a:extLst>
               <a:ext uri="{FF2B5EF4-FFF2-40B4-BE49-F238E27FC236}">
@@ -5425,7 +5303,7 @@
             </a:pPr>
             <a:r>
               <a:rPr lang="de-DE" sz="2200" i="1"/>
-              <a:t>“Why no standard integer? “</a:t>
+              <a:t>“What if we added a standard integer instead? “</a:t>
             </a:r>
           </a:p>
           <a:p>
@@ -5434,17 +5312,45 @@
               <a:buChar char="•"/>
             </a:pPr>
             <a:r>
+              <a:rPr lang="de-DE" sz="2000">
+                <a:highlight>
+                  <a:srgbClr val="FAFAFA"/>
+                </a:highlight>
+                <a:latin typeface="Aptos Mono" panose="020B0009020202020204" pitchFamily="49" charset="0"/>
+              </a:rPr>
+              <a:t>long long long</a:t>
+            </a:r>
+            <a:r>
               <a:rPr lang="de-DE" sz="2200">
                 <a:highlight>
                   <a:srgbClr val="FAFAFA"/>
                 </a:highlight>
                 <a:latin typeface="Aptos Mono" panose="020B0009020202020204" pitchFamily="49" charset="0"/>
               </a:rPr>
-              <a:t>long long long</a:t>
-            </a:r>
+              <a:t>?</a:t>
+            </a:r>
+            <a:endParaRPr lang="de-DE" sz="2200">
+              <a:latin typeface="Aptos Mono" panose="020B0009020202020204" pitchFamily="49" charset="0"/>
+            </a:endParaRPr>
+          </a:p>
+          <a:p>
+            <a:pPr marL="800100" lvl="1" indent="-342900">
+              <a:buFont typeface="Arial" panose="020B0604020202020204" pitchFamily="34" charset="0"/>
+              <a:buChar char="•"/>
+            </a:pPr>
             <a:r>
               <a:rPr lang="de-DE" sz="2200"/>
-              <a:t> is too long; also, this would </a:t>
+              <a:t>More core impact.</a:t>
+            </a:r>
+          </a:p>
+          <a:p>
+            <a:pPr marL="800100" lvl="1" indent="-342900">
+              <a:buFont typeface="Arial" panose="020B0604020202020204" pitchFamily="34" charset="0"/>
+              <a:buChar char="•"/>
+            </a:pPr>
+            <a:r>
+              <a:rPr lang="de-DE" sz="2200"/>
+              <a:t>Difference in </a:t>
             </a:r>
             <a:r>
               <a:rPr lang="de-DE" sz="2200">
@@ -5452,7 +5358,7 @@
                   <a:srgbClr val="FF0066"/>
                 </a:solidFill>
               </a:rPr>
-              <a:t>break ABI</a:t>
+              <a:t>conversion rank</a:t>
             </a:r>
             <a:r>
               <a:rPr lang="de-DE" sz="2200"/>
@@ -5469,7 +5375,7 @@
               <a:t>“Why no </a:t>
             </a:r>
             <a:r>
-              <a:rPr lang="de-DE" sz="2200" i="1">
+              <a:rPr lang="de-DE" sz="2000" i="1">
                 <a:highlight>
                   <a:srgbClr val="FAFAFA"/>
                 </a:highlight>
@@ -5532,7 +5438,7 @@
               <a:t> effort, better done through </a:t>
             </a:r>
             <a:r>
-              <a:rPr lang="de-DE" sz="2200">
+              <a:rPr lang="de-DE" sz="2000">
                 <a:highlight>
                   <a:srgbClr val="FAFAFA"/>
                 </a:highlight>
@@ -5643,43 +5549,6 @@
             <a:r>
               <a:rPr lang="de-DE" sz="2200"/>
               <a:t>.</a:t>
-            </a:r>
-            <a:endParaRPr lang="de-DE" sz="2200">
-              <a:solidFill>
-                <a:srgbClr val="FF0066"/>
-              </a:solidFill>
-              <a:highlight>
-                <a:srgbClr val="FAFAFA"/>
-              </a:highlight>
-              <a:latin typeface="Aptos Mono" panose="020B0009020202020204" pitchFamily="49" charset="0"/>
-            </a:endParaRPr>
-          </a:p>
-          <a:p>
-            <a:pPr marL="342900" indent="-342900">
-              <a:buFont typeface="Arial" panose="020B0604020202020204" pitchFamily="34" charset="0"/>
-              <a:buChar char="•"/>
-            </a:pPr>
-            <a:r>
-              <a:rPr lang="de-DE" sz="2200" i="1"/>
-              <a:t>“Why rely on extended integer semantics? “</a:t>
-            </a:r>
-          </a:p>
-          <a:p>
-            <a:pPr marL="800100" lvl="1" indent="-342900">
-              <a:buFont typeface="Arial" panose="020B0604020202020204" pitchFamily="34" charset="0"/>
-              <a:buChar char="•"/>
-            </a:pPr>
-            <a:r>
-              <a:rPr lang="de-DE" sz="2200">
-                <a:solidFill>
-                  <a:srgbClr val="FF0066"/>
-                </a:solidFill>
-              </a:rPr>
-              <a:t>No core wording</a:t>
-            </a:r>
-            <a:r>
-              <a:rPr lang="de-DE" sz="2200"/>
-              <a:t> changes; semantics are desirable.</a:t>
             </a:r>
           </a:p>
         </p:txBody>
@@ -5759,10 +5628,10 @@
       </p:sp>
       <p:pic>
         <p:nvPicPr>
-          <p:cNvPr id="3" name="Graphic 2">
-            <a:extLst>
-              <a:ext uri="{FF2B5EF4-FFF2-40B4-BE49-F238E27FC236}">
-                <a16:creationId xmlns:a16="http://schemas.microsoft.com/office/drawing/2014/main" id="{DBDFCB48-6DA9-4924-8392-60BB20D46DA8}"/>
+          <p:cNvPr id="2" name="Graphic 1">
+            <a:extLst>
+              <a:ext uri="{FF2B5EF4-FFF2-40B4-BE49-F238E27FC236}">
+                <a16:creationId xmlns:a16="http://schemas.microsoft.com/office/drawing/2014/main" id="{D2F8453D-37ED-8E5B-0A0F-C27BEEC1794E}"/>
               </a:ext>
             </a:extLst>
           </p:cNvPr>
@@ -5788,14 +5657,55 @@
         </p:blipFill>
         <p:spPr>
           <a:xfrm>
-            <a:off x="10989355" y="5195799"/>
-            <a:ext cx="1048303" cy="1048303"/>
+            <a:off x="10207148" y="5267770"/>
+            <a:ext cx="1781182" cy="1060153"/>
           </a:xfrm>
           <a:prstGeom prst="rect">
             <a:avLst/>
           </a:prstGeom>
         </p:spPr>
       </p:pic>
+      <p:sp>
+        <p:nvSpPr>
+          <p:cNvPr id="7" name="Textfeld 9">
+            <a:extLst>
+              <a:ext uri="{FF2B5EF4-FFF2-40B4-BE49-F238E27FC236}">
+                <a16:creationId xmlns:a16="http://schemas.microsoft.com/office/drawing/2014/main" id="{C29B4D40-4F44-68A8-9327-11BFA18A7F37}"/>
+              </a:ext>
+            </a:extLst>
+          </p:cNvPr>
+          <p:cNvSpPr txBox="1"/>
+          <p:nvPr/>
+        </p:nvSpPr>
+        <p:spPr>
+          <a:xfrm>
+            <a:off x="9602648" y="6283492"/>
+            <a:ext cx="2589352" cy="461665"/>
+          </a:xfrm>
+          <a:prstGeom prst="rect">
+            <a:avLst/>
+          </a:prstGeom>
+          <a:noFill/>
+        </p:spPr>
+        <p:txBody>
+          <a:bodyPr wrap="square">
+            <a:spAutoFit/>
+          </a:bodyPr>
+          <a:lstStyle/>
+          <a:p>
+            <a:pPr algn="r"/>
+            <a:r>
+              <a:rPr lang="de-DE" altLang="ja-JP" sz="2400" b="1">
+                <a:solidFill>
+                  <a:srgbClr val="FABCCF"/>
+                </a:solidFill>
+              </a:rPr>
+              <a:t>ST. LOUIS 2024</a:t>
+            </a:r>
+            <a:endParaRPr lang="en-DE" sz="2400"/>
+          </a:p>
+        </p:txBody>
+      </p:sp>
     </p:spTree>
     <p:extLst>
       <p:ext uri="{BB962C8B-B14F-4D97-AF65-F5344CB8AC3E}">
@@ -6040,92 +5950,6 @@
       </p:sp>
       <p:sp>
         <p:nvSpPr>
-          <p:cNvPr id="8" name="Textfeld 7">
-            <a:extLst>
-              <a:ext uri="{FF2B5EF4-FFF2-40B4-BE49-F238E27FC236}">
-                <a16:creationId xmlns:a16="http://schemas.microsoft.com/office/drawing/2014/main" id="{2687DB21-E114-1E4F-29AB-B2D599072FFF}"/>
-              </a:ext>
-            </a:extLst>
-          </p:cNvPr>
-          <p:cNvSpPr txBox="1"/>
-          <p:nvPr/>
-        </p:nvSpPr>
-        <p:spPr>
-          <a:xfrm>
-            <a:off x="10835014" y="6180478"/>
-            <a:ext cx="1356986" cy="769441"/>
-          </a:xfrm>
-          <a:prstGeom prst="rect">
-            <a:avLst/>
-          </a:prstGeom>
-          <a:noFill/>
-        </p:spPr>
-        <p:txBody>
-          <a:bodyPr wrap="square" anchor="ctr" anchorCtr="0">
-            <a:spAutoFit/>
-          </a:bodyPr>
-          <a:lstStyle/>
-          <a:p>
-            <a:pPr algn="r"/>
-            <a:r>
-              <a:rPr lang="ja-JP" altLang="en-US" sz="4400" b="1">
-                <a:solidFill>
-                  <a:srgbClr val="FABCCF"/>
-                </a:solidFill>
-              </a:rPr>
-              <a:t>東京</a:t>
-            </a:r>
-            <a:endParaRPr lang="en-DE" sz="4400" b="1">
-              <a:solidFill>
-                <a:srgbClr val="FABCCF"/>
-              </a:solidFill>
-            </a:endParaRPr>
-          </a:p>
-        </p:txBody>
-      </p:sp>
-      <p:sp>
-        <p:nvSpPr>
-          <p:cNvPr id="10" name="Textfeld 9">
-            <a:extLst>
-              <a:ext uri="{FF2B5EF4-FFF2-40B4-BE49-F238E27FC236}">
-                <a16:creationId xmlns:a16="http://schemas.microsoft.com/office/drawing/2014/main" id="{8A77F318-31B1-26EF-32FC-6C3A9FF3EE2F}"/>
-              </a:ext>
-            </a:extLst>
-          </p:cNvPr>
-          <p:cNvSpPr txBox="1"/>
-          <p:nvPr/>
-        </p:nvSpPr>
-        <p:spPr>
-          <a:xfrm>
-            <a:off x="9602648" y="6283492"/>
-            <a:ext cx="1453018" cy="523220"/>
-          </a:xfrm>
-          <a:prstGeom prst="rect">
-            <a:avLst/>
-          </a:prstGeom>
-          <a:noFill/>
-        </p:spPr>
-        <p:txBody>
-          <a:bodyPr wrap="square">
-            <a:spAutoFit/>
-          </a:bodyPr>
-          <a:lstStyle/>
-          <a:p>
-            <a:pPr algn="r"/>
-            <a:r>
-              <a:rPr lang="de-DE" altLang="ja-JP" sz="2800" b="1">
-                <a:solidFill>
-                  <a:srgbClr val="FABCCF"/>
-                </a:solidFill>
-              </a:rPr>
-              <a:t>2024</a:t>
-            </a:r>
-            <a:endParaRPr lang="en-DE" sz="2800"/>
-          </a:p>
-        </p:txBody>
-      </p:sp>
-      <p:sp>
-        <p:nvSpPr>
           <p:cNvPr id="11" name="Foliennummernplatzhalter 10">
             <a:extLst>
               <a:ext uri="{FF2B5EF4-FFF2-40B4-BE49-F238E27FC236}">
@@ -6143,7 +5967,7 @@
         <p:spPr>
           <a:xfrm>
             <a:off x="90434" y="6331718"/>
-            <a:ext cx="585069" cy="365125"/>
+            <a:ext cx="665470" cy="365125"/>
           </a:xfrm>
         </p:spPr>
         <p:txBody>
@@ -6196,7 +6020,7 @@
           <a:p>
             <a:r>
               <a:rPr lang="de-DE" sz="4800" b="1"/>
-              <a:t>References</a:t>
+              <a:t>6. Open questions</a:t>
             </a:r>
             <a:endParaRPr lang="en-DE" sz="4800" b="1"/>
           </a:p>
@@ -6217,7 +6041,7 @@
         <p:spPr>
           <a:xfrm>
             <a:off x="312561" y="1073457"/>
-            <a:ext cx="10676794" cy="954107"/>
+            <a:ext cx="11264246" cy="4493538"/>
           </a:xfrm>
           <a:prstGeom prst="rect">
             <a:avLst/>
@@ -6230,6 +6054,705 @@
           </a:bodyPr>
           <a:lstStyle/>
           <a:p>
+            <a:pPr marL="342900" indent="-342900">
+              <a:buFont typeface="Arial" panose="020B0604020202020204" pitchFamily="34" charset="0"/>
+              <a:buChar char="•"/>
+            </a:pPr>
+            <a:r>
+              <a:rPr lang="de-DE" sz="2200" i="1"/>
+              <a:t>“Do we want 128-bit fundamental type integers in the language? “</a:t>
+            </a:r>
+          </a:p>
+          <a:p>
+            <a:pPr marL="800100" lvl="1" indent="-342900">
+              <a:buFont typeface="Arial" panose="020B0604020202020204" pitchFamily="34" charset="0"/>
+              <a:buChar char="•"/>
+            </a:pPr>
+            <a:r>
+              <a:rPr lang="de-DE" sz="2200"/>
+              <a:t>If not, </a:t>
+            </a:r>
+            <a:r>
+              <a:rPr lang="de-DE" sz="2200">
+                <a:solidFill>
+                  <a:srgbClr val="FF0066"/>
+                </a:solidFill>
+              </a:rPr>
+              <a:t>drastic changes</a:t>
+            </a:r>
+            <a:r>
+              <a:rPr lang="de-DE" sz="2200"/>
+              <a:t> to proposal needed</a:t>
+            </a:r>
+          </a:p>
+          <a:p>
+            <a:pPr marL="342900" indent="-342900">
+              <a:buFont typeface="Arial" panose="020B0604020202020204" pitchFamily="34" charset="0"/>
+              <a:buChar char="•"/>
+            </a:pPr>
+            <a:r>
+              <a:rPr lang="de-DE" sz="2200" i="1"/>
+              <a:t>“Is a </a:t>
+            </a:r>
+            <a:r>
+              <a:rPr lang="de-DE" sz="2200" i="1">
+                <a:solidFill>
+                  <a:srgbClr val="FF0066"/>
+                </a:solidFill>
+              </a:rPr>
+              <a:t>non-general solution</a:t>
+            </a:r>
+            <a:r>
+              <a:rPr lang="de-DE" sz="2200" i="1"/>
+              <a:t> (no 256-bit, no arbitrary bit, etc.) worth pursuing?“</a:t>
+            </a:r>
+            <a:endParaRPr lang="de-DE" sz="2200"/>
+          </a:p>
+          <a:p>
+            <a:pPr marL="342900" indent="-342900">
+              <a:buFont typeface="Arial" panose="020B0604020202020204" pitchFamily="34" charset="0"/>
+              <a:buChar char="•"/>
+            </a:pPr>
+            <a:r>
+              <a:rPr lang="de-DE" sz="2200" i="1"/>
+              <a:t>“Do we want them to be (mandatory) extended integers, or standard integers?“</a:t>
+            </a:r>
+          </a:p>
+          <a:p>
+            <a:pPr marL="800100" lvl="1" indent="-342900">
+              <a:buFont typeface="Arial" panose="020B0604020202020204" pitchFamily="34" charset="0"/>
+              <a:buChar char="•"/>
+            </a:pPr>
+            <a:r>
+              <a:rPr lang="de-DE" sz="2200"/>
+              <a:t>Observable difference: </a:t>
+            </a:r>
+            <a:r>
+              <a:rPr lang="de-DE" sz="2200">
+                <a:solidFill>
+                  <a:srgbClr val="FF0066"/>
+                </a:solidFill>
+              </a:rPr>
+              <a:t>conversion rank</a:t>
+            </a:r>
+            <a:r>
+              <a:rPr lang="de-DE" sz="2200"/>
+              <a:t> vs. </a:t>
+            </a:r>
+            <a:r>
+              <a:rPr lang="de-DE" sz="2000">
+                <a:highlight>
+                  <a:srgbClr val="DDDDDD"/>
+                </a:highlight>
+                <a:latin typeface="Aptos Mono" panose="020B0009020202020204" pitchFamily="49" charset="0"/>
+              </a:rPr>
+              <a:t>long long</a:t>
+            </a:r>
+          </a:p>
+          <a:p>
+            <a:pPr marL="342900" indent="-342900">
+              <a:buFont typeface="Arial" panose="020B0604020202020204" pitchFamily="34" charset="0"/>
+              <a:buChar char="•"/>
+            </a:pPr>
+            <a:r>
+              <a:rPr lang="de-DE" sz="2200" i="1"/>
+              <a:t>“Should 128-bit integers be mandatory for freestanding implementations?“</a:t>
+            </a:r>
+          </a:p>
+          <a:p>
+            <a:pPr marL="800100" lvl="1" indent="-342900">
+              <a:buFont typeface="Arial" panose="020B0604020202020204" pitchFamily="34" charset="0"/>
+              <a:buChar char="•"/>
+            </a:pPr>
+            <a:r>
+              <a:rPr lang="de-DE" sz="2200"/>
+              <a:t>Author position: </a:t>
+            </a:r>
+            <a:r>
+              <a:rPr lang="de-DE" sz="2200">
+                <a:solidFill>
+                  <a:srgbClr val="FF0066"/>
+                </a:solidFill>
+              </a:rPr>
+              <a:t>neutral</a:t>
+            </a:r>
+          </a:p>
+          <a:p>
+            <a:pPr marL="342900" indent="-342900">
+              <a:buFont typeface="Arial" panose="020B0604020202020204" pitchFamily="34" charset="0"/>
+              <a:buChar char="•"/>
+            </a:pPr>
+            <a:r>
+              <a:rPr lang="de-DE" sz="2200" i="1"/>
+              <a:t>“Should 128-bit integers be entirely optional? “</a:t>
+            </a:r>
+          </a:p>
+          <a:p>
+            <a:pPr marL="800100" lvl="1" indent="-342900">
+              <a:buFont typeface="Arial" panose="020B0604020202020204" pitchFamily="34" charset="0"/>
+              <a:buChar char="•"/>
+            </a:pPr>
+            <a:r>
+              <a:rPr lang="de-DE" sz="2200"/>
+              <a:t>Author position: </a:t>
+            </a:r>
+            <a:r>
+              <a:rPr lang="de-DE" sz="2200">
+                <a:solidFill>
+                  <a:srgbClr val="FF0066"/>
+                </a:solidFill>
+              </a:rPr>
+              <a:t>strongly against</a:t>
+            </a:r>
+          </a:p>
+          <a:p>
+            <a:pPr marL="342900" indent="-342900">
+              <a:buFont typeface="Arial" panose="020B0604020202020204" pitchFamily="34" charset="0"/>
+              <a:buChar char="•"/>
+            </a:pPr>
+            <a:r>
+              <a:rPr lang="de-DE" sz="2200" i="1"/>
+              <a:t>“Is it acceptable for them to be a distinct type from </a:t>
+            </a:r>
+            <a:r>
+              <a:rPr lang="de-DE" sz="2000" i="1">
+                <a:highlight>
+                  <a:srgbClr val="DDDDDD"/>
+                </a:highlight>
+                <a:latin typeface="Aptos Mono" panose="020B0009020202020204" pitchFamily="49" charset="0"/>
+              </a:rPr>
+              <a:t>__int128</a:t>
+            </a:r>
+            <a:r>
+              <a:rPr lang="de-DE" sz="2200" i="1"/>
+              <a:t>, even on implementations that already support such a 128-bit integer type?“</a:t>
+            </a:r>
+          </a:p>
+          <a:p>
+            <a:pPr marL="342900" indent="-342900">
+              <a:buFont typeface="Arial" panose="020B0604020202020204" pitchFamily="34" charset="0"/>
+              <a:buChar char="•"/>
+            </a:pPr>
+            <a:r>
+              <a:rPr lang="de-DE" sz="2200" i="1"/>
+              <a:t>“Do we pursue </a:t>
+            </a:r>
+            <a:r>
+              <a:rPr lang="de-DE" sz="2200" i="1">
+                <a:solidFill>
+                  <a:srgbClr val="FF0066"/>
+                </a:solidFill>
+              </a:rPr>
+              <a:t>library changes</a:t>
+            </a:r>
+            <a:r>
+              <a:rPr lang="de-DE" sz="2200" i="1"/>
+              <a:t> which increase support for additional integer types (extended or otherwise) and prevent them from breaking ABI? “</a:t>
+            </a:r>
+          </a:p>
+        </p:txBody>
+      </p:sp>
+      <p:sp>
+        <p:nvSpPr>
+          <p:cNvPr id="15" name="Textfeld 14">
+            <a:extLst>
+              <a:ext uri="{FF2B5EF4-FFF2-40B4-BE49-F238E27FC236}">
+                <a16:creationId xmlns:a16="http://schemas.microsoft.com/office/drawing/2014/main" id="{B50C3D4C-3BF6-E6DD-C495-2D365D7A7431}"/>
+              </a:ext>
+            </a:extLst>
+          </p:cNvPr>
+          <p:cNvSpPr txBox="1"/>
+          <p:nvPr/>
+        </p:nvSpPr>
+        <p:spPr>
+          <a:xfrm>
+            <a:off x="1336431" y="6211669"/>
+            <a:ext cx="8767796" cy="646331"/>
+          </a:xfrm>
+          <a:prstGeom prst="rect">
+            <a:avLst/>
+          </a:prstGeom>
+          <a:noFill/>
+        </p:spPr>
+        <p:txBody>
+          <a:bodyPr wrap="square" rtlCol="0">
+            <a:spAutoFit/>
+          </a:bodyPr>
+          <a:lstStyle/>
+          <a:p>
+            <a:pPr algn="ctr"/>
+            <a:r>
+              <a:rPr lang="de-DE" b="1">
+                <a:solidFill>
+                  <a:schemeClr val="bg1">
+                    <a:lumMod val="85000"/>
+                  </a:schemeClr>
+                </a:solidFill>
+              </a:rPr>
+              <a:t>P3140   </a:t>
+            </a:r>
+            <a:r>
+              <a:rPr lang="de-DE" b="1">
+                <a:solidFill>
+                  <a:schemeClr val="bg1">
+                    <a:lumMod val="85000"/>
+                  </a:schemeClr>
+                </a:solidFill>
+                <a:latin typeface="Aptos Mono" panose="020B0009020202020204" pitchFamily="49" charset="0"/>
+              </a:rPr>
+              <a:t>std::int_least128_t</a:t>
+            </a:r>
+          </a:p>
+          <a:p>
+            <a:pPr algn="ctr"/>
+            <a:r>
+              <a:rPr lang="de-DE">
+                <a:solidFill>
+                  <a:schemeClr val="bg1">
+                    <a:lumMod val="85000"/>
+                  </a:schemeClr>
+                </a:solidFill>
+              </a:rPr>
+              <a:t>Jan Schultke</a:t>
+            </a:r>
+            <a:endParaRPr lang="en-DE">
+              <a:solidFill>
+                <a:schemeClr val="bg1">
+                  <a:lumMod val="85000"/>
+                </a:schemeClr>
+              </a:solidFill>
+            </a:endParaRPr>
+          </a:p>
+        </p:txBody>
+      </p:sp>
+      <p:pic>
+        <p:nvPicPr>
+          <p:cNvPr id="2" name="Graphic 1">
+            <a:extLst>
+              <a:ext uri="{FF2B5EF4-FFF2-40B4-BE49-F238E27FC236}">
+                <a16:creationId xmlns:a16="http://schemas.microsoft.com/office/drawing/2014/main" id="{D2F8453D-37ED-8E5B-0A0F-C27BEEC1794E}"/>
+              </a:ext>
+            </a:extLst>
+          </p:cNvPr>
+          <p:cNvPicPr>
+            <a:picLocks noChangeAspect="1"/>
+          </p:cNvPicPr>
+          <p:nvPr/>
+        </p:nvPicPr>
+        <p:blipFill>
+          <a:blip r:embed="rId2">
+            <a:extLst>
+              <a:ext uri="{28A0092B-C50C-407E-A947-70E740481C1C}">
+                <a14:useLocalDpi xmlns:a14="http://schemas.microsoft.com/office/drawing/2010/main" val="0"/>
+              </a:ext>
+              <a:ext uri="{96DAC541-7B7A-43D3-8B79-37D633B846F1}">
+                <asvg:svgBlip xmlns:asvg="http://schemas.microsoft.com/office/drawing/2016/SVG/main" r:embed="rId3"/>
+              </a:ext>
+            </a:extLst>
+          </a:blip>
+          <a:stretch>
+            <a:fillRect/>
+          </a:stretch>
+        </p:blipFill>
+        <p:spPr>
+          <a:xfrm>
+            <a:off x="10207148" y="5267770"/>
+            <a:ext cx="1781182" cy="1060153"/>
+          </a:xfrm>
+          <a:prstGeom prst="rect">
+            <a:avLst/>
+          </a:prstGeom>
+        </p:spPr>
+      </p:pic>
+      <p:sp>
+        <p:nvSpPr>
+          <p:cNvPr id="7" name="Textfeld 9">
+            <a:extLst>
+              <a:ext uri="{FF2B5EF4-FFF2-40B4-BE49-F238E27FC236}">
+                <a16:creationId xmlns:a16="http://schemas.microsoft.com/office/drawing/2014/main" id="{C29B4D40-4F44-68A8-9327-11BFA18A7F37}"/>
+              </a:ext>
+            </a:extLst>
+          </p:cNvPr>
+          <p:cNvSpPr txBox="1"/>
+          <p:nvPr/>
+        </p:nvSpPr>
+        <p:spPr>
+          <a:xfrm>
+            <a:off x="9602648" y="6283492"/>
+            <a:ext cx="2589352" cy="461665"/>
+          </a:xfrm>
+          <a:prstGeom prst="rect">
+            <a:avLst/>
+          </a:prstGeom>
+          <a:noFill/>
+        </p:spPr>
+        <p:txBody>
+          <a:bodyPr wrap="square">
+            <a:spAutoFit/>
+          </a:bodyPr>
+          <a:lstStyle/>
+          <a:p>
+            <a:pPr algn="r"/>
+            <a:r>
+              <a:rPr lang="de-DE" altLang="ja-JP" sz="2400" b="1">
+                <a:solidFill>
+                  <a:srgbClr val="FABCCF"/>
+                </a:solidFill>
+              </a:rPr>
+              <a:t>ST. LOUIS 2024</a:t>
+            </a:r>
+            <a:endParaRPr lang="en-DE" sz="2400"/>
+          </a:p>
+        </p:txBody>
+      </p:sp>
+    </p:spTree>
+    <p:extLst>
+      <p:ext uri="{BB962C8B-B14F-4D97-AF65-F5344CB8AC3E}">
+        <p14:creationId xmlns:p14="http://schemas.microsoft.com/office/powerpoint/2010/main" val="3954802560"/>
+      </p:ext>
+    </p:extLst>
+  </p:cSld>
+  <p:clrMapOvr>
+    <a:masterClrMapping/>
+  </p:clrMapOvr>
+</p:sld>
+</file>
+
+<file path=ppt/slides/slide13.xml><?xml version="1.0" encoding="utf-8"?>
+<p:sld xmlns:a="http://schemas.openxmlformats.org/drawingml/2006/main" xmlns:r="http://schemas.openxmlformats.org/officeDocument/2006/relationships" xmlns:p="http://schemas.openxmlformats.org/presentationml/2006/main">
+  <p:cSld>
+    <p:spTree>
+      <p:nvGrpSpPr>
+        <p:cNvPr id="1" name=""/>
+        <p:cNvGrpSpPr/>
+        <p:nvPr/>
+      </p:nvGrpSpPr>
+      <p:grpSpPr>
+        <a:xfrm>
+          <a:off x="0" y="0"/>
+          <a:ext cx="0" cy="0"/>
+          <a:chOff x="0" y="0"/>
+          <a:chExt cx="0" cy="0"/>
+        </a:xfrm>
+      </p:grpSpPr>
+      <p:sp>
+        <p:nvSpPr>
+          <p:cNvPr id="13" name="Rechteck 12">
+            <a:extLst>
+              <a:ext uri="{FF2B5EF4-FFF2-40B4-BE49-F238E27FC236}">
+                <a16:creationId xmlns:a16="http://schemas.microsoft.com/office/drawing/2014/main" id="{AB5CC674-D606-3406-C686-7E1E12531B6A}"/>
+              </a:ext>
+            </a:extLst>
+          </p:cNvPr>
+          <p:cNvSpPr/>
+          <p:nvPr/>
+        </p:nvSpPr>
+        <p:spPr>
+          <a:xfrm>
+            <a:off x="0" y="1"/>
+            <a:ext cx="12192000" cy="841428"/>
+          </a:xfrm>
+          <a:prstGeom prst="rect">
+            <a:avLst/>
+          </a:prstGeom>
+          <a:solidFill>
+            <a:schemeClr val="bg1">
+              <a:lumMod val="95000"/>
+            </a:schemeClr>
+          </a:solidFill>
+          <a:ln>
+            <a:noFill/>
+          </a:ln>
+        </p:spPr>
+        <p:style>
+          <a:lnRef idx="2">
+            <a:schemeClr val="accent1">
+              <a:shade val="15000"/>
+            </a:schemeClr>
+          </a:lnRef>
+          <a:fillRef idx="1">
+            <a:schemeClr val="accent1"/>
+          </a:fillRef>
+          <a:effectRef idx="0">
+            <a:schemeClr val="accent1"/>
+          </a:effectRef>
+          <a:fontRef idx="minor">
+            <a:schemeClr val="lt1"/>
+          </a:fontRef>
+        </p:style>
+        <p:txBody>
+          <a:bodyPr rtlCol="0" anchor="ctr"/>
+          <a:lstStyle/>
+          <a:p>
+            <a:pPr algn="ctr"/>
+            <a:endParaRPr lang="en-DE"/>
+          </a:p>
+        </p:txBody>
+      </p:sp>
+      <p:sp>
+        <p:nvSpPr>
+          <p:cNvPr id="4" name="Rechteck 3">
+            <a:extLst>
+              <a:ext uri="{FF2B5EF4-FFF2-40B4-BE49-F238E27FC236}">
+                <a16:creationId xmlns:a16="http://schemas.microsoft.com/office/drawing/2014/main" id="{F2F9FFB0-05D1-4434-BE8A-86794DC79A86}"/>
+              </a:ext>
+            </a:extLst>
+          </p:cNvPr>
+          <p:cNvSpPr/>
+          <p:nvPr/>
+        </p:nvSpPr>
+        <p:spPr>
+          <a:xfrm>
+            <a:off x="0" y="6172198"/>
+            <a:ext cx="12192000" cy="685801"/>
+          </a:xfrm>
+          <a:prstGeom prst="rect">
+            <a:avLst/>
+          </a:prstGeom>
+          <a:solidFill>
+            <a:schemeClr val="tx1"/>
+          </a:solidFill>
+          <a:ln>
+            <a:noFill/>
+          </a:ln>
+        </p:spPr>
+        <p:style>
+          <a:lnRef idx="2">
+            <a:schemeClr val="dk1">
+              <a:shade val="15000"/>
+            </a:schemeClr>
+          </a:lnRef>
+          <a:fillRef idx="1">
+            <a:schemeClr val="dk1"/>
+          </a:fillRef>
+          <a:effectRef idx="0">
+            <a:schemeClr val="dk1"/>
+          </a:effectRef>
+          <a:fontRef idx="minor">
+            <a:schemeClr val="lt1"/>
+          </a:fontRef>
+        </p:style>
+        <p:txBody>
+          <a:bodyPr rtlCol="0" anchor="ctr"/>
+          <a:lstStyle/>
+          <a:p>
+            <a:pPr algn="ctr"/>
+            <a:endParaRPr lang="en-DE"/>
+          </a:p>
+        </p:txBody>
+      </p:sp>
+      <p:sp>
+        <p:nvSpPr>
+          <p:cNvPr id="5" name="Rechteck 4">
+            <a:extLst>
+              <a:ext uri="{FF2B5EF4-FFF2-40B4-BE49-F238E27FC236}">
+                <a16:creationId xmlns:a16="http://schemas.microsoft.com/office/drawing/2014/main" id="{4C46F138-CA47-78A1-D6FB-E5AEAE7EAD3E}"/>
+              </a:ext>
+            </a:extLst>
+          </p:cNvPr>
+          <p:cNvSpPr/>
+          <p:nvPr/>
+        </p:nvSpPr>
+        <p:spPr>
+          <a:xfrm>
+            <a:off x="0" y="6088558"/>
+            <a:ext cx="12192000" cy="91920"/>
+          </a:xfrm>
+          <a:prstGeom prst="rect">
+            <a:avLst/>
+          </a:prstGeom>
+          <a:solidFill>
+            <a:srgbClr val="FABCCF"/>
+          </a:solidFill>
+          <a:ln>
+            <a:noFill/>
+          </a:ln>
+        </p:spPr>
+        <p:style>
+          <a:lnRef idx="2">
+            <a:schemeClr val="dk1">
+              <a:shade val="15000"/>
+            </a:schemeClr>
+          </a:lnRef>
+          <a:fillRef idx="1">
+            <a:schemeClr val="dk1"/>
+          </a:fillRef>
+          <a:effectRef idx="0">
+            <a:schemeClr val="dk1"/>
+          </a:effectRef>
+          <a:fontRef idx="minor">
+            <a:schemeClr val="lt1"/>
+          </a:fontRef>
+        </p:style>
+        <p:txBody>
+          <a:bodyPr rtlCol="0" anchor="ctr"/>
+          <a:lstStyle/>
+          <a:p>
+            <a:pPr algn="ctr"/>
+            <a:endParaRPr lang="en-DE"/>
+          </a:p>
+        </p:txBody>
+      </p:sp>
+      <p:sp>
+        <p:nvSpPr>
+          <p:cNvPr id="6" name="Rechteck 5">
+            <a:extLst>
+              <a:ext uri="{FF2B5EF4-FFF2-40B4-BE49-F238E27FC236}">
+                <a16:creationId xmlns:a16="http://schemas.microsoft.com/office/drawing/2014/main" id="{D6DF6F79-9702-1B2D-B337-C13368EDAE95}"/>
+              </a:ext>
+            </a:extLst>
+          </p:cNvPr>
+          <p:cNvSpPr/>
+          <p:nvPr/>
+        </p:nvSpPr>
+        <p:spPr>
+          <a:xfrm>
+            <a:off x="0" y="5927168"/>
+            <a:ext cx="12192000" cy="159518"/>
+          </a:xfrm>
+          <a:prstGeom prst="rect">
+            <a:avLst/>
+          </a:prstGeom>
+          <a:solidFill>
+            <a:schemeClr val="bg1">
+              <a:lumMod val="95000"/>
+            </a:schemeClr>
+          </a:solidFill>
+          <a:ln>
+            <a:noFill/>
+          </a:ln>
+        </p:spPr>
+        <p:style>
+          <a:lnRef idx="2">
+            <a:schemeClr val="dk1">
+              <a:shade val="15000"/>
+            </a:schemeClr>
+          </a:lnRef>
+          <a:fillRef idx="1">
+            <a:schemeClr val="dk1"/>
+          </a:fillRef>
+          <a:effectRef idx="0">
+            <a:schemeClr val="dk1"/>
+          </a:effectRef>
+          <a:fontRef idx="minor">
+            <a:schemeClr val="lt1"/>
+          </a:fontRef>
+        </p:style>
+        <p:txBody>
+          <a:bodyPr rtlCol="0" anchor="ctr"/>
+          <a:lstStyle/>
+          <a:p>
+            <a:pPr algn="ctr"/>
+            <a:endParaRPr lang="en-DE"/>
+          </a:p>
+        </p:txBody>
+      </p:sp>
+      <p:sp>
+        <p:nvSpPr>
+          <p:cNvPr id="11" name="Foliennummernplatzhalter 10">
+            <a:extLst>
+              <a:ext uri="{FF2B5EF4-FFF2-40B4-BE49-F238E27FC236}">
+                <a16:creationId xmlns:a16="http://schemas.microsoft.com/office/drawing/2014/main" id="{D4706ECE-D040-7093-5E5E-CA78FAA6D2CB}"/>
+              </a:ext>
+            </a:extLst>
+          </p:cNvPr>
+          <p:cNvSpPr>
+            <a:spLocks noGrp="1"/>
+          </p:cNvSpPr>
+          <p:nvPr>
+            <p:ph type="sldNum" sz="quarter" idx="12"/>
+          </p:nvPr>
+        </p:nvSpPr>
+        <p:spPr>
+          <a:xfrm>
+            <a:off x="90434" y="6331718"/>
+            <a:ext cx="585069" cy="365125"/>
+          </a:xfrm>
+        </p:spPr>
+        <p:txBody>
+          <a:bodyPr/>
+          <a:lstStyle/>
+          <a:p>
+            <a:fld id="{4E013C7D-59EF-4845-9E34-76F90254E037}" type="slidenum">
+              <a:rPr lang="en-DE" sz="2800" b="1" smtClean="0">
+                <a:solidFill>
+                  <a:schemeClr val="bg1"/>
+                </a:solidFill>
+              </a:rPr>
+              <a:t>12</a:t>
+            </a:fld>
+            <a:endParaRPr lang="en-DE" sz="2800" b="1">
+              <a:solidFill>
+                <a:schemeClr val="bg1"/>
+              </a:solidFill>
+            </a:endParaRPr>
+          </a:p>
+        </p:txBody>
+      </p:sp>
+      <p:sp>
+        <p:nvSpPr>
+          <p:cNvPr id="12" name="Textfeld 11">
+            <a:extLst>
+              <a:ext uri="{FF2B5EF4-FFF2-40B4-BE49-F238E27FC236}">
+                <a16:creationId xmlns:a16="http://schemas.microsoft.com/office/drawing/2014/main" id="{DE687096-3384-3D10-D13A-F84118487586}"/>
+              </a:ext>
+            </a:extLst>
+          </p:cNvPr>
+          <p:cNvSpPr txBox="1"/>
+          <p:nvPr/>
+        </p:nvSpPr>
+        <p:spPr>
+          <a:xfrm>
+            <a:off x="296006" y="10432"/>
+            <a:ext cx="10554087" cy="830997"/>
+          </a:xfrm>
+          <a:prstGeom prst="rect">
+            <a:avLst/>
+          </a:prstGeom>
+          <a:noFill/>
+        </p:spPr>
+        <p:txBody>
+          <a:bodyPr wrap="square" rtlCol="0">
+            <a:spAutoFit/>
+          </a:bodyPr>
+          <a:lstStyle/>
+          <a:p>
+            <a:r>
+              <a:rPr lang="de-DE" sz="4800" b="1"/>
+              <a:t>References</a:t>
+            </a:r>
+            <a:endParaRPr lang="en-DE" sz="4800" b="1"/>
+          </a:p>
+        </p:txBody>
+      </p:sp>
+      <p:sp>
+        <p:nvSpPr>
+          <p:cNvPr id="14" name="Textfeld 13">
+            <a:extLst>
+              <a:ext uri="{FF2B5EF4-FFF2-40B4-BE49-F238E27FC236}">
+                <a16:creationId xmlns:a16="http://schemas.microsoft.com/office/drawing/2014/main" id="{628D3CBC-1457-29F8-565B-1BF68746439C}"/>
+              </a:ext>
+            </a:extLst>
+          </p:cNvPr>
+          <p:cNvSpPr txBox="1"/>
+          <p:nvPr/>
+        </p:nvSpPr>
+        <p:spPr>
+          <a:xfrm>
+            <a:off x="312561" y="1073457"/>
+            <a:ext cx="10676794" cy="954107"/>
+          </a:xfrm>
+          <a:prstGeom prst="rect">
+            <a:avLst/>
+          </a:prstGeom>
+          <a:noFill/>
+        </p:spPr>
+        <p:txBody>
+          <a:bodyPr wrap="square" rtlCol="0">
+            <a:spAutoFit/>
+          </a:bodyPr>
+          <a:lstStyle/>
+          <a:p>
             <a:r>
               <a:rPr lang="de-DE" sz="2800" i="1"/>
               <a:t>Jan Schultke;</a:t>
@@ -6275,12 +6798,85 @@
           </a:p>
         </p:txBody>
       </p:sp>
+      <p:sp>
+        <p:nvSpPr>
+          <p:cNvPr id="7" name="Textfeld 14">
+            <a:extLst>
+              <a:ext uri="{FF2B5EF4-FFF2-40B4-BE49-F238E27FC236}">
+                <a16:creationId xmlns:a16="http://schemas.microsoft.com/office/drawing/2014/main" id="{4A4D5EB1-4B17-B6CD-D4C6-9950F154247D}"/>
+              </a:ext>
+            </a:extLst>
+          </p:cNvPr>
+          <p:cNvSpPr txBox="1"/>
+          <p:nvPr/>
+        </p:nvSpPr>
+        <p:spPr>
+          <a:xfrm>
+            <a:off x="1336431" y="6211669"/>
+            <a:ext cx="8767796" cy="646331"/>
+          </a:xfrm>
+          <a:prstGeom prst="rect">
+            <a:avLst/>
+          </a:prstGeom>
+          <a:noFill/>
+        </p:spPr>
+        <p:txBody>
+          <a:bodyPr wrap="square" rtlCol="0">
+            <a:spAutoFit/>
+          </a:bodyPr>
+          <a:lstStyle/>
+          <a:p>
+            <a:pPr algn="ctr"/>
+            <a:r>
+              <a:rPr lang="de-DE" b="1">
+                <a:solidFill>
+                  <a:schemeClr val="bg1">
+                    <a:lumMod val="85000"/>
+                  </a:schemeClr>
+                </a:solidFill>
+              </a:rPr>
+              <a:t>P3140   </a:t>
+            </a:r>
+            <a:r>
+              <a:rPr lang="de-DE" b="1">
+                <a:solidFill>
+                  <a:schemeClr val="bg1">
+                    <a:lumMod val="85000"/>
+                  </a:schemeClr>
+                </a:solidFill>
+                <a:latin typeface="Aptos Mono" panose="020B0009020202020204" pitchFamily="49" charset="0"/>
+              </a:rPr>
+              <a:t>std::int_least128_t</a:t>
+            </a:r>
+          </a:p>
+          <a:p>
+            <a:pPr algn="ctr"/>
+            <a:r>
+              <a:rPr lang="de-DE">
+                <a:solidFill>
+                  <a:schemeClr val="bg1">
+                    <a:lumMod val="85000"/>
+                  </a:schemeClr>
+                </a:solidFill>
+              </a:rPr>
+              <a:t>Jan Schultke</a:t>
+            </a:r>
+            <a:endParaRPr lang="en-DE">
+              <a:solidFill>
+                <a:schemeClr val="bg1">
+                  <a:lumMod val="85000"/>
+                </a:schemeClr>
+              </a:solidFill>
+            </a:endParaRPr>
+          </a:p>
+        </p:txBody>
+      </p:sp>
       <p:pic>
         <p:nvPicPr>
-          <p:cNvPr id="3" name="Graphic 2">
-            <a:extLst>
-              <a:ext uri="{FF2B5EF4-FFF2-40B4-BE49-F238E27FC236}">
-                <a16:creationId xmlns:a16="http://schemas.microsoft.com/office/drawing/2014/main" id="{DBDFCB48-6DA9-4924-8392-60BB20D46DA8}"/>
+          <p:cNvPr id="2" name="Graphic 1">
+            <a:extLst>
+              <a:ext uri="{FF2B5EF4-FFF2-40B4-BE49-F238E27FC236}">
+                <a16:creationId xmlns:a16="http://schemas.microsoft.com/office/drawing/2014/main" id="{05D9A394-BA53-F83D-6EBC-E1E1565BC475}"/>
               </a:ext>
             </a:extLst>
           </p:cNvPr>
@@ -6306,8 +6902,8 @@
         </p:blipFill>
         <p:spPr>
           <a:xfrm>
-            <a:off x="10989355" y="5195799"/>
-            <a:ext cx="1048303" cy="1048303"/>
+            <a:off x="10207148" y="5267770"/>
+            <a:ext cx="1781182" cy="1060153"/>
           </a:xfrm>
           <a:prstGeom prst="rect">
             <a:avLst/>
@@ -6316,10 +6912,10 @@
       </p:pic>
       <p:sp>
         <p:nvSpPr>
-          <p:cNvPr id="7" name="Textfeld 14">
-            <a:extLst>
-              <a:ext uri="{FF2B5EF4-FFF2-40B4-BE49-F238E27FC236}">
-                <a16:creationId xmlns:a16="http://schemas.microsoft.com/office/drawing/2014/main" id="{4A4D5EB1-4B17-B6CD-D4C6-9950F154247D}"/>
+          <p:cNvPr id="9" name="Textfeld 9">
+            <a:extLst>
+              <a:ext uri="{FF2B5EF4-FFF2-40B4-BE49-F238E27FC236}">
+                <a16:creationId xmlns:a16="http://schemas.microsoft.com/office/drawing/2014/main" id="{A750D5D9-91A2-6B8D-DE59-48A96F8C57D0}"/>
               </a:ext>
             </a:extLst>
           </p:cNvPr>
@@ -6328,8 +6924,8 @@
         </p:nvSpPr>
         <p:spPr>
           <a:xfrm>
-            <a:off x="1336431" y="6211669"/>
-            <a:ext cx="8767796" cy="646331"/>
+            <a:off x="9602648" y="6283492"/>
+            <a:ext cx="2589352" cy="461665"/>
           </a:xfrm>
           <a:prstGeom prst="rect">
             <a:avLst/>
@@ -6337,53 +6933,21 @@
           <a:noFill/>
         </p:spPr>
         <p:txBody>
-          <a:bodyPr wrap="square" rtlCol="0">
+          <a:bodyPr wrap="square">
             <a:spAutoFit/>
           </a:bodyPr>
           <a:lstStyle/>
           <a:p>
-            <a:pPr algn="ctr"/>
-            <a:r>
-              <a:rPr lang="de-DE" b="1">
-                <a:solidFill>
-                  <a:schemeClr val="bg1">
-                    <a:lumMod val="85000"/>
-                  </a:schemeClr>
-                </a:solidFill>
-              </a:rPr>
-              <a:t>P3140   </a:t>
-            </a:r>
-            <a:r>
-              <a:rPr lang="de-DE" b="1">
-                <a:solidFill>
-                  <a:schemeClr val="bg1">
-                    <a:lumMod val="85000"/>
-                  </a:schemeClr>
-                </a:solidFill>
-                <a:latin typeface="Aptos Mono" panose="020B0009020202020204" pitchFamily="49" charset="0"/>
-              </a:rPr>
-              <a:t>std::int_least128_t</a:t>
-            </a:r>
-          </a:p>
-          <a:p>
-            <a:pPr algn="ctr"/>
-            <a:r>
-              <a:rPr lang="de-DE">
-                <a:solidFill>
-                  <a:schemeClr val="bg1">
-                    <a:lumMod val="85000"/>
-                  </a:schemeClr>
-                </a:solidFill>
-              </a:rPr>
-              <a:t>Jan Schultke</a:t>
-            </a:r>
-            <a:endParaRPr lang="en-DE">
-              <a:solidFill>
-                <a:schemeClr val="bg1">
-                  <a:lumMod val="85000"/>
-                </a:schemeClr>
-              </a:solidFill>
-            </a:endParaRPr>
+            <a:pPr algn="r"/>
+            <a:r>
+              <a:rPr lang="de-DE" altLang="ja-JP" sz="2400" b="1">
+                <a:solidFill>
+                  <a:srgbClr val="FABCCF"/>
+                </a:solidFill>
+              </a:rPr>
+              <a:t>ST. LOUIS 2024</a:t>
+            </a:r>
+            <a:endParaRPr lang="en-DE" sz="2400"/>
           </a:p>
         </p:txBody>
       </p:sp>
@@ -6631,92 +7195,6 @@
       </p:sp>
       <p:sp>
         <p:nvSpPr>
-          <p:cNvPr id="8" name="Textfeld 7">
-            <a:extLst>
-              <a:ext uri="{FF2B5EF4-FFF2-40B4-BE49-F238E27FC236}">
-                <a16:creationId xmlns:a16="http://schemas.microsoft.com/office/drawing/2014/main" id="{2687DB21-E114-1E4F-29AB-B2D599072FFF}"/>
-              </a:ext>
-            </a:extLst>
-          </p:cNvPr>
-          <p:cNvSpPr txBox="1"/>
-          <p:nvPr/>
-        </p:nvSpPr>
-        <p:spPr>
-          <a:xfrm>
-            <a:off x="10835014" y="6180478"/>
-            <a:ext cx="1356986" cy="769441"/>
-          </a:xfrm>
-          <a:prstGeom prst="rect">
-            <a:avLst/>
-          </a:prstGeom>
-          <a:noFill/>
-        </p:spPr>
-        <p:txBody>
-          <a:bodyPr wrap="square" anchor="ctr" anchorCtr="0">
-            <a:spAutoFit/>
-          </a:bodyPr>
-          <a:lstStyle/>
-          <a:p>
-            <a:pPr algn="r"/>
-            <a:r>
-              <a:rPr lang="ja-JP" altLang="en-US" sz="4400" b="1">
-                <a:solidFill>
-                  <a:srgbClr val="FABCCF"/>
-                </a:solidFill>
-              </a:rPr>
-              <a:t>東京</a:t>
-            </a:r>
-            <a:endParaRPr lang="en-DE" sz="4400" b="1">
-              <a:solidFill>
-                <a:srgbClr val="FABCCF"/>
-              </a:solidFill>
-            </a:endParaRPr>
-          </a:p>
-        </p:txBody>
-      </p:sp>
-      <p:sp>
-        <p:nvSpPr>
-          <p:cNvPr id="10" name="Textfeld 9">
-            <a:extLst>
-              <a:ext uri="{FF2B5EF4-FFF2-40B4-BE49-F238E27FC236}">
-                <a16:creationId xmlns:a16="http://schemas.microsoft.com/office/drawing/2014/main" id="{8A77F318-31B1-26EF-32FC-6C3A9FF3EE2F}"/>
-              </a:ext>
-            </a:extLst>
-          </p:cNvPr>
-          <p:cNvSpPr txBox="1"/>
-          <p:nvPr/>
-        </p:nvSpPr>
-        <p:spPr>
-          <a:xfrm>
-            <a:off x="9602648" y="6283492"/>
-            <a:ext cx="1453018" cy="523220"/>
-          </a:xfrm>
-          <a:prstGeom prst="rect">
-            <a:avLst/>
-          </a:prstGeom>
-          <a:noFill/>
-        </p:spPr>
-        <p:txBody>
-          <a:bodyPr wrap="square">
-            <a:spAutoFit/>
-          </a:bodyPr>
-          <a:lstStyle/>
-          <a:p>
-            <a:pPr algn="r"/>
-            <a:r>
-              <a:rPr lang="de-DE" altLang="ja-JP" sz="2800" b="1">
-                <a:solidFill>
-                  <a:srgbClr val="FABCCF"/>
-                </a:solidFill>
-              </a:rPr>
-              <a:t>2024</a:t>
-            </a:r>
-            <a:endParaRPr lang="en-DE" sz="2800"/>
-          </a:p>
-        </p:txBody>
-      </p:sp>
-      <p:sp>
-        <p:nvSpPr>
           <p:cNvPr id="11" name="Foliennummernplatzhalter 10">
             <a:extLst>
               <a:ext uri="{FF2B5EF4-FFF2-40B4-BE49-F238E27FC236}">
@@ -6807,8 +7285,8 @@
         </p:nvSpPr>
         <p:spPr>
           <a:xfrm>
-            <a:off x="296006" y="1779479"/>
-            <a:ext cx="10676794" cy="3170099"/>
+            <a:off x="296006" y="1376807"/>
+            <a:ext cx="10676794" cy="3785652"/>
           </a:xfrm>
           <a:prstGeom prst="rect">
             <a:avLst/>
@@ -6876,6 +7354,16 @@
             <a:r>
               <a:rPr lang="de-DE" sz="4000"/>
               <a:t> Design</a:t>
+            </a:r>
+          </a:p>
+          <a:p>
+            <a:pPr marL="342900" indent="-342900">
+              <a:buFont typeface="+mj-lt"/>
+              <a:buAutoNum type="arabicPeriod"/>
+            </a:pPr>
+            <a:r>
+              <a:rPr lang="de-DE" sz="4000"/>
+              <a:t> Open questions</a:t>
             </a:r>
           </a:p>
         </p:txBody>
@@ -6955,10 +7443,10 @@
       </p:sp>
       <p:pic>
         <p:nvPicPr>
-          <p:cNvPr id="3" name="Graphic 2">
-            <a:extLst>
-              <a:ext uri="{FF2B5EF4-FFF2-40B4-BE49-F238E27FC236}">
-                <a16:creationId xmlns:a16="http://schemas.microsoft.com/office/drawing/2014/main" id="{DBDFCB48-6DA9-4924-8392-60BB20D46DA8}"/>
+          <p:cNvPr id="7" name="Graphic 6">
+            <a:extLst>
+              <a:ext uri="{FF2B5EF4-FFF2-40B4-BE49-F238E27FC236}">
+                <a16:creationId xmlns:a16="http://schemas.microsoft.com/office/drawing/2014/main" id="{BB720968-C548-F372-DF20-F96D863E512E}"/>
               </a:ext>
             </a:extLst>
           </p:cNvPr>
@@ -6984,14 +7472,55 @@
         </p:blipFill>
         <p:spPr>
           <a:xfrm>
-            <a:off x="10989355" y="5195799"/>
-            <a:ext cx="1048303" cy="1048303"/>
+            <a:off x="10207148" y="5267770"/>
+            <a:ext cx="1781182" cy="1060153"/>
           </a:xfrm>
           <a:prstGeom prst="rect">
             <a:avLst/>
           </a:prstGeom>
         </p:spPr>
       </p:pic>
+      <p:sp>
+        <p:nvSpPr>
+          <p:cNvPr id="10" name="Textfeld 9">
+            <a:extLst>
+              <a:ext uri="{FF2B5EF4-FFF2-40B4-BE49-F238E27FC236}">
+                <a16:creationId xmlns:a16="http://schemas.microsoft.com/office/drawing/2014/main" id="{8A77F318-31B1-26EF-32FC-6C3A9FF3EE2F}"/>
+              </a:ext>
+            </a:extLst>
+          </p:cNvPr>
+          <p:cNvSpPr txBox="1"/>
+          <p:nvPr/>
+        </p:nvSpPr>
+        <p:spPr>
+          <a:xfrm>
+            <a:off x="9602648" y="6283492"/>
+            <a:ext cx="2589352" cy="461665"/>
+          </a:xfrm>
+          <a:prstGeom prst="rect">
+            <a:avLst/>
+          </a:prstGeom>
+          <a:noFill/>
+        </p:spPr>
+        <p:txBody>
+          <a:bodyPr wrap="square">
+            <a:spAutoFit/>
+          </a:bodyPr>
+          <a:lstStyle/>
+          <a:p>
+            <a:pPr algn="r"/>
+            <a:r>
+              <a:rPr lang="de-DE" altLang="ja-JP" sz="2400" b="1">
+                <a:solidFill>
+                  <a:srgbClr val="FABCCF"/>
+                </a:solidFill>
+              </a:rPr>
+              <a:t>ST. LOUIS 2024</a:t>
+            </a:r>
+            <a:endParaRPr lang="en-DE" sz="2400"/>
+          </a:p>
+        </p:txBody>
+      </p:sp>
     </p:spTree>
     <p:extLst>
       <p:ext uri="{BB962C8B-B14F-4D97-AF65-F5344CB8AC3E}">
@@ -7236,92 +7765,6 @@
       </p:sp>
       <p:sp>
         <p:nvSpPr>
-          <p:cNvPr id="8" name="Textfeld 7">
-            <a:extLst>
-              <a:ext uri="{FF2B5EF4-FFF2-40B4-BE49-F238E27FC236}">
-                <a16:creationId xmlns:a16="http://schemas.microsoft.com/office/drawing/2014/main" id="{2687DB21-E114-1E4F-29AB-B2D599072FFF}"/>
-              </a:ext>
-            </a:extLst>
-          </p:cNvPr>
-          <p:cNvSpPr txBox="1"/>
-          <p:nvPr/>
-        </p:nvSpPr>
-        <p:spPr>
-          <a:xfrm>
-            <a:off x="10835014" y="6180478"/>
-            <a:ext cx="1356986" cy="769441"/>
-          </a:xfrm>
-          <a:prstGeom prst="rect">
-            <a:avLst/>
-          </a:prstGeom>
-          <a:noFill/>
-        </p:spPr>
-        <p:txBody>
-          <a:bodyPr wrap="square" anchor="ctr" anchorCtr="0">
-            <a:spAutoFit/>
-          </a:bodyPr>
-          <a:lstStyle/>
-          <a:p>
-            <a:pPr algn="r"/>
-            <a:r>
-              <a:rPr lang="ja-JP" altLang="en-US" sz="4400" b="1">
-                <a:solidFill>
-                  <a:srgbClr val="FABCCF"/>
-                </a:solidFill>
-              </a:rPr>
-              <a:t>東京</a:t>
-            </a:r>
-            <a:endParaRPr lang="en-DE" sz="4400" b="1">
-              <a:solidFill>
-                <a:srgbClr val="FABCCF"/>
-              </a:solidFill>
-            </a:endParaRPr>
-          </a:p>
-        </p:txBody>
-      </p:sp>
-      <p:sp>
-        <p:nvSpPr>
-          <p:cNvPr id="10" name="Textfeld 9">
-            <a:extLst>
-              <a:ext uri="{FF2B5EF4-FFF2-40B4-BE49-F238E27FC236}">
-                <a16:creationId xmlns:a16="http://schemas.microsoft.com/office/drawing/2014/main" id="{8A77F318-31B1-26EF-32FC-6C3A9FF3EE2F}"/>
-              </a:ext>
-            </a:extLst>
-          </p:cNvPr>
-          <p:cNvSpPr txBox="1"/>
-          <p:nvPr/>
-        </p:nvSpPr>
-        <p:spPr>
-          <a:xfrm>
-            <a:off x="9602648" y="6283492"/>
-            <a:ext cx="1453018" cy="523220"/>
-          </a:xfrm>
-          <a:prstGeom prst="rect">
-            <a:avLst/>
-          </a:prstGeom>
-          <a:noFill/>
-        </p:spPr>
-        <p:txBody>
-          <a:bodyPr wrap="square">
-            <a:spAutoFit/>
-          </a:bodyPr>
-          <a:lstStyle/>
-          <a:p>
-            <a:pPr algn="r"/>
-            <a:r>
-              <a:rPr lang="de-DE" altLang="ja-JP" sz="2800" b="1">
-                <a:solidFill>
-                  <a:srgbClr val="FABCCF"/>
-                </a:solidFill>
-              </a:rPr>
-              <a:t>2024</a:t>
-            </a:r>
-            <a:endParaRPr lang="en-DE" sz="2800"/>
-          </a:p>
-        </p:txBody>
-      </p:sp>
-      <p:sp>
-        <p:nvSpPr>
           <p:cNvPr id="11" name="Foliennummernplatzhalter 10">
             <a:extLst>
               <a:ext uri="{FF2B5EF4-FFF2-40B4-BE49-F238E27FC236}">
@@ -7413,7 +7856,7 @@
         <p:spPr>
           <a:xfrm>
             <a:off x="312561" y="1073457"/>
-            <a:ext cx="10676794" cy="4708981"/>
+            <a:ext cx="10676794" cy="4832092"/>
           </a:xfrm>
           <a:prstGeom prst="rect">
             <a:avLst/>
@@ -7432,17 +7875,14 @@
             </a:r>
             <a:r>
               <a:rPr lang="de-DE" sz="3600" b="1"/>
-              <a:t> types for </a:t>
-            </a:r>
-            <a:r>
-              <a:rPr lang="de-DE" sz="3600" b="1">
-                <a:highlight>
-                  <a:srgbClr val="FAFAFA"/>
-                </a:highlight>
-                <a:latin typeface="Aptos Mono" panose="020B0009020202020204" pitchFamily="49" charset="0"/>
-              </a:rPr>
-              <a:t>&lt;cmath&gt;</a:t>
-            </a:r>
+              <a:t> types</a:t>
+            </a:r>
+            <a:endParaRPr lang="de-DE" sz="3600" b="1">
+              <a:highlight>
+                <a:srgbClr val="FAFAFA"/>
+              </a:highlight>
+              <a:latin typeface="Aptos Mono" panose="020B0009020202020204" pitchFamily="49" charset="0"/>
+            </a:endParaRPr>
           </a:p>
           <a:p>
             <a:endParaRPr lang="de-DE" sz="2000">
@@ -7453,6 +7893,161 @@
             </a:endParaRPr>
           </a:p>
           <a:p>
+            <a:pPr marL="342900" indent="-342900">
+              <a:buFont typeface="Arial" panose="020B0604020202020204" pitchFamily="34" charset="0"/>
+              <a:buChar char="•"/>
+            </a:pPr>
+            <a:r>
+              <a:rPr lang="de-DE" sz="2400"/>
+              <a:t>128-bit signed and unsigned integers</a:t>
+            </a:r>
+          </a:p>
+          <a:p>
+            <a:pPr marL="342900" indent="-342900">
+              <a:buFont typeface="Arial" panose="020B0604020202020204" pitchFamily="34" charset="0"/>
+              <a:buChar char="•"/>
+            </a:pPr>
+            <a:r>
+              <a:rPr lang="de-DE" sz="2000">
+                <a:highlight>
+                  <a:srgbClr val="DDDDDD"/>
+                </a:highlight>
+                <a:latin typeface="Aptos Mono" panose="020B0009020202020204" pitchFamily="49" charset="0"/>
+              </a:rPr>
+              <a:t>std::int_least128_t</a:t>
+            </a:r>
+            <a:r>
+              <a:rPr lang="de-DE" sz="2400"/>
+              <a:t>, </a:t>
+            </a:r>
+            <a:r>
+              <a:rPr lang="de-DE" sz="2000">
+                <a:highlight>
+                  <a:srgbClr val="DDDDDD"/>
+                </a:highlight>
+                <a:latin typeface="Aptos Mono" panose="020B0009020202020204" pitchFamily="49" charset="0"/>
+              </a:rPr>
+              <a:t>std::uint_least128_t</a:t>
+            </a:r>
+            <a:r>
+              <a:rPr lang="de-DE" sz="2400"/>
+              <a:t>, etc. spellings</a:t>
+            </a:r>
+          </a:p>
+          <a:p>
+            <a:endParaRPr lang="de-DE" sz="2400">
+              <a:latin typeface="Aptos Mono" panose="020B0009020202020204" pitchFamily="49" charset="0"/>
+            </a:endParaRPr>
+          </a:p>
+          <a:p>
+            <a:r>
+              <a:rPr lang="de-DE" sz="3600" b="1" err="1"/>
+              <a:t>Desired</a:t>
+            </a:r>
+            <a:r>
+              <a:rPr lang="de-DE" sz="3600" b="1"/>
+              <a:t> </a:t>
+            </a:r>
+            <a:r>
+              <a:rPr lang="de-DE" sz="3600" b="1" err="1"/>
+              <a:t>semantics</a:t>
+            </a:r>
+            <a:endParaRPr lang="de-DE" sz="3600" b="1"/>
+          </a:p>
+          <a:p>
+            <a:pPr marL="342900" indent="-342900">
+              <a:buFont typeface="Arial" panose="020B0604020202020204" pitchFamily="34" charset="0"/>
+              <a:buChar char="•"/>
+            </a:pPr>
+            <a:r>
+              <a:rPr lang="de-DE" sz="2400"/>
+              <a:t>Width </a:t>
+            </a:r>
+            <a:r>
+              <a:rPr lang="de-DE" sz="2400" err="1"/>
+              <a:t>of</a:t>
+            </a:r>
+            <a:r>
+              <a:rPr lang="de-DE" sz="2400">
+                <a:solidFill>
+                  <a:srgbClr val="FF0066"/>
+                </a:solidFill>
+              </a:rPr>
+              <a:t> ≥ 128</a:t>
+            </a:r>
+            <a:r>
+              <a:rPr lang="de-DE" sz="2400"/>
+              <a:t> </a:t>
+            </a:r>
+            <a:r>
+              <a:rPr lang="de-DE" sz="2400" err="1"/>
+              <a:t>bits</a:t>
+            </a:r>
+            <a:r>
+              <a:rPr lang="de-DE" sz="2400"/>
+              <a:t> </a:t>
+            </a:r>
+            <a:r>
+              <a:rPr lang="de-DE" sz="2400">
+                <a:solidFill>
+                  <a:schemeClr val="tx1">
+                    <a:lumMod val="50000"/>
+                    <a:lumOff val="50000"/>
+                  </a:schemeClr>
+                </a:solidFill>
+              </a:rPr>
+              <a:t>(minimum-</a:t>
+            </a:r>
+            <a:r>
+              <a:rPr lang="de-DE" sz="2400" err="1">
+                <a:solidFill>
+                  <a:schemeClr val="tx1">
+                    <a:lumMod val="50000"/>
+                    <a:lumOff val="50000"/>
+                  </a:schemeClr>
+                </a:solidFill>
+              </a:rPr>
+              <a:t>width</a:t>
+            </a:r>
+            <a:r>
+              <a:rPr lang="de-DE" sz="2400">
+                <a:solidFill>
+                  <a:schemeClr val="tx1">
+                    <a:lumMod val="50000"/>
+                    <a:lumOff val="50000"/>
+                  </a:schemeClr>
+                </a:solidFill>
+              </a:rPr>
+              <a:t> </a:t>
+            </a:r>
+            <a:r>
+              <a:rPr lang="de-DE" sz="2400" err="1">
+                <a:solidFill>
+                  <a:schemeClr val="tx1">
+                    <a:lumMod val="50000"/>
+                    <a:lumOff val="50000"/>
+                  </a:schemeClr>
+                </a:solidFill>
+              </a:rPr>
+              <a:t>types</a:t>
+            </a:r>
+            <a:r>
+              <a:rPr lang="de-DE" sz="2400">
+                <a:solidFill>
+                  <a:schemeClr val="tx1">
+                    <a:lumMod val="50000"/>
+                    <a:lumOff val="50000"/>
+                  </a:schemeClr>
+                </a:solidFill>
+              </a:rPr>
+              <a:t>)</a:t>
+            </a:r>
+          </a:p>
+          <a:p>
+            <a:pPr marL="800100" lvl="1" indent="-342900">
+              <a:buFont typeface="Arial" panose="020B0604020202020204" pitchFamily="34" charset="0"/>
+              <a:buChar char="•"/>
+            </a:pPr>
             <a:r>
               <a:rPr lang="de-DE" sz="2000">
                 <a:highlight>
@@ -7460,13 +8055,11 @@
                 </a:highlight>
                 <a:latin typeface="Aptos Mono" panose="020B0009020202020204" pitchFamily="49" charset="0"/>
               </a:rPr>
-              <a:t>std::int_least128_t</a:t>
-            </a:r>
-            <a:r>
-              <a:rPr lang="de-DE" sz="2000">
-                <a:latin typeface="Aptos Mono" panose="020B0009020202020204" pitchFamily="49" charset="0"/>
-              </a:rPr>
-              <a:t>  </a:t>
+              <a:t>std::int128_t</a:t>
+            </a:r>
+            <a:r>
+              <a:rPr lang="de-DE" sz="2400"/>
+              <a:t> and </a:t>
             </a:r>
             <a:r>
               <a:rPr lang="de-DE" sz="2000">
@@ -7475,54 +8068,23 @@
                 </a:highlight>
                 <a:latin typeface="Aptos Mono" panose="020B0009020202020204" pitchFamily="49" charset="0"/>
               </a:rPr>
-              <a:t>std::int_fast128_t</a:t>
-            </a:r>
-          </a:p>
-          <a:p>
-            <a:r>
-              <a:rPr lang="de-DE" sz="2000">
-                <a:highlight>
-                  <a:srgbClr val="FAFAFA"/>
-                </a:highlight>
-                <a:latin typeface="Aptos Mono" panose="020B0009020202020204" pitchFamily="49" charset="0"/>
-              </a:rPr>
-              <a:t>std::uint_least128_t</a:t>
-            </a:r>
-            <a:r>
-              <a:rPr lang="de-DE" sz="2000">
-                <a:latin typeface="Aptos Mono" panose="020B0009020202020204" pitchFamily="49" charset="0"/>
-              </a:rPr>
-              <a:t> </a:t>
-            </a:r>
-            <a:r>
-              <a:rPr lang="de-DE" sz="2000">
-                <a:highlight>
-                  <a:srgbClr val="FAFAFA"/>
-                </a:highlight>
-                <a:latin typeface="Aptos Mono" panose="020B0009020202020204" pitchFamily="49" charset="0"/>
-              </a:rPr>
-              <a:t>std::uint_fast128_t</a:t>
-            </a:r>
-          </a:p>
-          <a:p>
-            <a:endParaRPr lang="de-DE" sz="2400">
-              <a:latin typeface="Aptos Mono" panose="020B0009020202020204" pitchFamily="49" charset="0"/>
-            </a:endParaRPr>
-          </a:p>
-          <a:p>
-            <a:r>
-              <a:rPr lang="de-DE" sz="3600" b="1" err="1"/>
-              <a:t>Desired</a:t>
-            </a:r>
-            <a:r>
-              <a:rPr lang="de-DE" sz="3600" b="1"/>
-              <a:t> </a:t>
-            </a:r>
-            <a:r>
-              <a:rPr lang="de-DE" sz="3600" b="1" err="1"/>
-              <a:t>semantics</a:t>
-            </a:r>
-            <a:endParaRPr lang="de-DE" sz="3600" b="1"/>
+              <a:t>std::uint128_t</a:t>
+            </a:r>
+            <a:r>
+              <a:rPr lang="de-DE" sz="2400"/>
+              <a:t> by proxy </a:t>
+            </a:r>
+            <a:r>
+              <a:rPr lang="de-DE" sz="2400">
+                <a:solidFill>
+                  <a:schemeClr val="tx1">
+                    <a:lumMod val="50000"/>
+                    <a:lumOff val="50000"/>
+                  </a:schemeClr>
+                </a:solidFill>
+              </a:rPr>
+              <a:t>(exact-width types)</a:t>
+            </a:r>
           </a:p>
           <a:p>
             <a:pPr marL="342900" indent="-342900">
@@ -7531,11 +8093,7 @@
             </a:pPr>
             <a:r>
               <a:rPr lang="de-DE" sz="2400"/>
-              <a:t>Width </a:t>
-            </a:r>
-            <a:r>
-              <a:rPr lang="de-DE" sz="2400" err="1"/>
-              <a:t>of</a:t>
+              <a:t>Types are </a:t>
             </a:r>
             <a:r>
               <a:rPr lang="de-DE" sz="2400">
@@ -7543,177 +8101,11 @@
                   <a:srgbClr val="FF0066"/>
                 </a:solidFill>
               </a:rPr>
-              <a:t> ≥ 128</a:t>
+              <a:t>mandatory</a:t>
             </a:r>
             <a:r>
               <a:rPr lang="de-DE" sz="2400"/>
-              <a:t> </a:t>
-            </a:r>
-            <a:r>
-              <a:rPr lang="de-DE" sz="2400" err="1"/>
-              <a:t>bits</a:t>
-            </a:r>
-            <a:r>
-              <a:rPr lang="de-DE" sz="2400"/>
-              <a:t> </a:t>
-            </a:r>
-            <a:r>
-              <a:rPr lang="de-DE" sz="2400">
-                <a:solidFill>
-                  <a:schemeClr val="tx1">
-                    <a:lumMod val="50000"/>
-                    <a:lumOff val="50000"/>
-                  </a:schemeClr>
-                </a:solidFill>
-              </a:rPr>
-              <a:t>(minimum-</a:t>
-            </a:r>
-            <a:r>
-              <a:rPr lang="de-DE" sz="2400" err="1">
-                <a:solidFill>
-                  <a:schemeClr val="tx1">
-                    <a:lumMod val="50000"/>
-                    <a:lumOff val="50000"/>
-                  </a:schemeClr>
-                </a:solidFill>
-              </a:rPr>
-              <a:t>width</a:t>
-            </a:r>
-            <a:r>
-              <a:rPr lang="de-DE" sz="2400">
-                <a:solidFill>
-                  <a:schemeClr val="tx1">
-                    <a:lumMod val="50000"/>
-                    <a:lumOff val="50000"/>
-                  </a:schemeClr>
-                </a:solidFill>
-              </a:rPr>
-              <a:t> </a:t>
-            </a:r>
-            <a:r>
-              <a:rPr lang="de-DE" sz="2400" err="1">
-                <a:solidFill>
-                  <a:schemeClr val="tx1">
-                    <a:lumMod val="50000"/>
-                    <a:lumOff val="50000"/>
-                  </a:schemeClr>
-                </a:solidFill>
-              </a:rPr>
-              <a:t>types</a:t>
-            </a:r>
-            <a:r>
-              <a:rPr lang="de-DE" sz="2400">
-                <a:solidFill>
-                  <a:schemeClr val="tx1">
-                    <a:lumMod val="50000"/>
-                    <a:lumOff val="50000"/>
-                  </a:schemeClr>
-                </a:solidFill>
-              </a:rPr>
-              <a:t>)</a:t>
-            </a:r>
-          </a:p>
-          <a:p>
-            <a:pPr marL="800100" lvl="1" indent="-342900">
-              <a:buFont typeface="Arial" panose="020B0604020202020204" pitchFamily="34" charset="0"/>
-              <a:buChar char="•"/>
-            </a:pPr>
-            <a:r>
-              <a:rPr lang="de-DE" sz="2000">
-                <a:highlight>
-                  <a:srgbClr val="FAFAFA"/>
-                </a:highlight>
-                <a:latin typeface="Aptos Mono" panose="020B0009020202020204" pitchFamily="49" charset="0"/>
-              </a:rPr>
-              <a:t>std::int128_t</a:t>
-            </a:r>
-            <a:r>
-              <a:rPr lang="de-DE" sz="2400"/>
-              <a:t> and </a:t>
-            </a:r>
-            <a:r>
-              <a:rPr lang="de-DE" sz="2000">
-                <a:highlight>
-                  <a:srgbClr val="FAFAFA"/>
-                </a:highlight>
-                <a:latin typeface="Aptos Mono" panose="020B0009020202020204" pitchFamily="49" charset="0"/>
-              </a:rPr>
-              <a:t>std::uint128_t</a:t>
-            </a:r>
-            <a:r>
-              <a:rPr lang="de-DE" sz="2400"/>
-              <a:t> </a:t>
-            </a:r>
-            <a:r>
-              <a:rPr lang="de-DE" sz="2400" err="1"/>
-              <a:t>by</a:t>
-            </a:r>
-            <a:r>
-              <a:rPr lang="de-DE" sz="2400"/>
-              <a:t> </a:t>
-            </a:r>
-            <a:r>
-              <a:rPr lang="de-DE" sz="2400" err="1"/>
-              <a:t>proxy</a:t>
-            </a:r>
-            <a:r>
-              <a:rPr lang="de-DE" sz="2400"/>
-              <a:t> </a:t>
-            </a:r>
-            <a:r>
-              <a:rPr lang="de-DE" sz="2400">
-                <a:solidFill>
-                  <a:schemeClr val="tx1">
-                    <a:lumMod val="50000"/>
-                    <a:lumOff val="50000"/>
-                  </a:schemeClr>
-                </a:solidFill>
-              </a:rPr>
-              <a:t>(</a:t>
-            </a:r>
-            <a:r>
-              <a:rPr lang="de-DE" sz="2400" err="1">
-                <a:solidFill>
-                  <a:schemeClr val="tx1">
-                    <a:lumMod val="50000"/>
-                    <a:lumOff val="50000"/>
-                  </a:schemeClr>
-                </a:solidFill>
-              </a:rPr>
-              <a:t>exact-width</a:t>
-            </a:r>
-            <a:r>
-              <a:rPr lang="de-DE" sz="2400">
-                <a:solidFill>
-                  <a:schemeClr val="tx1">
-                    <a:lumMod val="50000"/>
-                    <a:lumOff val="50000"/>
-                  </a:schemeClr>
-                </a:solidFill>
-              </a:rPr>
-              <a:t> </a:t>
-            </a:r>
-            <a:r>
-              <a:rPr lang="de-DE" sz="2400" err="1">
-                <a:solidFill>
-                  <a:schemeClr val="tx1">
-                    <a:lumMod val="50000"/>
-                    <a:lumOff val="50000"/>
-                  </a:schemeClr>
-                </a:solidFill>
-              </a:rPr>
-              <a:t>types</a:t>
-            </a:r>
-            <a:r>
-              <a:rPr lang="de-DE" sz="2400">
-                <a:solidFill>
-                  <a:schemeClr val="tx1">
-                    <a:lumMod val="50000"/>
-                    <a:lumOff val="50000"/>
-                  </a:schemeClr>
-                </a:solidFill>
-              </a:rPr>
-              <a:t>)</a:t>
+              <a:t> (at least on hosted platforms)</a:t>
             </a:r>
           </a:p>
           <a:p>
@@ -7722,65 +8114,29 @@
               <a:buChar char="•"/>
             </a:pPr>
             <a:r>
+              <a:rPr lang="de-DE" sz="2400"/>
+              <a:t>Types </a:t>
+            </a:r>
+            <a:r>
               <a:rPr lang="de-DE" sz="2400" err="1"/>
-              <a:t>Types</a:t>
+              <a:t>are</a:t>
             </a:r>
             <a:r>
               <a:rPr lang="de-DE" sz="2400"/>
               <a:t> </a:t>
             </a:r>
             <a:r>
-              <a:rPr lang="de-DE" sz="2400" err="1"/>
-              <a:t>are</a:t>
+              <a:rPr lang="de-DE" sz="2400">
+                <a:solidFill>
+                  <a:srgbClr val="FF0066"/>
+                </a:solidFill>
+              </a:rPr>
+              <a:t>extended integer types </a:t>
             </a:r>
             <a:r>
               <a:rPr lang="de-DE" sz="2400"/>
-              <a:t> </a:t>
-            </a:r>
-            <a:r>
-              <a:rPr lang="de-DE" sz="2400" err="1">
-                <a:solidFill>
-                  <a:srgbClr val="FF0066"/>
-                </a:solidFill>
-              </a:rPr>
-              <a:t>mandatory</a:t>
-            </a:r>
-            <a:endParaRPr lang="de-DE" sz="2400">
-              <a:solidFill>
-                <a:srgbClr val="FF0066"/>
-              </a:solidFill>
-            </a:endParaRPr>
-          </a:p>
-          <a:p>
-            <a:pPr marL="342900" indent="-342900">
-              <a:buFont typeface="Arial" panose="020B0604020202020204" pitchFamily="34" charset="0"/>
-              <a:buChar char="•"/>
-            </a:pPr>
-            <a:r>
-              <a:rPr lang="de-DE" sz="2400" err="1"/>
-              <a:t>Types</a:t>
-            </a:r>
-            <a:r>
-              <a:rPr lang="de-DE" sz="2400"/>
-              <a:t> </a:t>
-            </a:r>
-            <a:r>
-              <a:rPr lang="de-DE" sz="2400" err="1"/>
-              <a:t>are</a:t>
-            </a:r>
-            <a:r>
-              <a:rPr lang="de-DE" sz="2400"/>
-              <a:t> </a:t>
-            </a:r>
-            <a:r>
-              <a:rPr lang="de-DE" sz="2400">
-                <a:solidFill>
-                  <a:srgbClr val="FF0066"/>
-                </a:solidFill>
-              </a:rPr>
-              <a:t>extended integer types</a:t>
-            </a:r>
-            <a:endParaRPr lang="de-DE" sz="2400"/>
+              <a:t>(currently proposed, subject to change?)</a:t>
+            </a:r>
           </a:p>
           <a:p>
             <a:pPr marL="342900" indent="-342900">
@@ -7907,10 +8263,10 @@
       </p:sp>
       <p:pic>
         <p:nvPicPr>
-          <p:cNvPr id="3" name="Graphic 2">
-            <a:extLst>
-              <a:ext uri="{FF2B5EF4-FFF2-40B4-BE49-F238E27FC236}">
-                <a16:creationId xmlns:a16="http://schemas.microsoft.com/office/drawing/2014/main" id="{DBDFCB48-6DA9-4924-8392-60BB20D46DA8}"/>
+          <p:cNvPr id="2" name="Graphic 1">
+            <a:extLst>
+              <a:ext uri="{FF2B5EF4-FFF2-40B4-BE49-F238E27FC236}">
+                <a16:creationId xmlns:a16="http://schemas.microsoft.com/office/drawing/2014/main" id="{717495C2-7C5C-6140-2D6F-A3E203CC5EFA}"/>
               </a:ext>
             </a:extLst>
           </p:cNvPr>
@@ -7936,14 +8292,55 @@
         </p:blipFill>
         <p:spPr>
           <a:xfrm>
-            <a:off x="10989355" y="5195799"/>
-            <a:ext cx="1048303" cy="1048303"/>
+            <a:off x="10207148" y="5267770"/>
+            <a:ext cx="1781182" cy="1060153"/>
           </a:xfrm>
           <a:prstGeom prst="rect">
             <a:avLst/>
           </a:prstGeom>
         </p:spPr>
       </p:pic>
+      <p:sp>
+        <p:nvSpPr>
+          <p:cNvPr id="7" name="Textfeld 9">
+            <a:extLst>
+              <a:ext uri="{FF2B5EF4-FFF2-40B4-BE49-F238E27FC236}">
+                <a16:creationId xmlns:a16="http://schemas.microsoft.com/office/drawing/2014/main" id="{0DBB6D90-C91C-4609-FA03-2E9F6EB20FFC}"/>
+              </a:ext>
+            </a:extLst>
+          </p:cNvPr>
+          <p:cNvSpPr txBox="1"/>
+          <p:nvPr/>
+        </p:nvSpPr>
+        <p:spPr>
+          <a:xfrm>
+            <a:off x="9602648" y="6283492"/>
+            <a:ext cx="2589352" cy="461665"/>
+          </a:xfrm>
+          <a:prstGeom prst="rect">
+            <a:avLst/>
+          </a:prstGeom>
+          <a:noFill/>
+        </p:spPr>
+        <p:txBody>
+          <a:bodyPr wrap="square">
+            <a:spAutoFit/>
+          </a:bodyPr>
+          <a:lstStyle/>
+          <a:p>
+            <a:pPr algn="r"/>
+            <a:r>
+              <a:rPr lang="de-DE" altLang="ja-JP" sz="2400" b="1">
+                <a:solidFill>
+                  <a:srgbClr val="FABCCF"/>
+                </a:solidFill>
+              </a:rPr>
+              <a:t>ST. LOUIS 2024</a:t>
+            </a:r>
+            <a:endParaRPr lang="en-DE" sz="2400"/>
+          </a:p>
+        </p:txBody>
+      </p:sp>
     </p:spTree>
     <p:extLst>
       <p:ext uri="{BB962C8B-B14F-4D97-AF65-F5344CB8AC3E}">
@@ -8188,92 +8585,6 @@
       </p:sp>
       <p:sp>
         <p:nvSpPr>
-          <p:cNvPr id="8" name="Textfeld 7">
-            <a:extLst>
-              <a:ext uri="{FF2B5EF4-FFF2-40B4-BE49-F238E27FC236}">
-                <a16:creationId xmlns:a16="http://schemas.microsoft.com/office/drawing/2014/main" id="{2687DB21-E114-1E4F-29AB-B2D599072FFF}"/>
-              </a:ext>
-            </a:extLst>
-          </p:cNvPr>
-          <p:cNvSpPr txBox="1"/>
-          <p:nvPr/>
-        </p:nvSpPr>
-        <p:spPr>
-          <a:xfrm>
-            <a:off x="10835014" y="6180478"/>
-            <a:ext cx="1356986" cy="769441"/>
-          </a:xfrm>
-          <a:prstGeom prst="rect">
-            <a:avLst/>
-          </a:prstGeom>
-          <a:noFill/>
-        </p:spPr>
-        <p:txBody>
-          <a:bodyPr wrap="square" anchor="ctr" anchorCtr="0">
-            <a:spAutoFit/>
-          </a:bodyPr>
-          <a:lstStyle/>
-          <a:p>
-            <a:pPr algn="r"/>
-            <a:r>
-              <a:rPr lang="ja-JP" altLang="en-US" sz="4400" b="1">
-                <a:solidFill>
-                  <a:srgbClr val="FABCCF"/>
-                </a:solidFill>
-              </a:rPr>
-              <a:t>東京</a:t>
-            </a:r>
-            <a:endParaRPr lang="en-DE" sz="4400" b="1">
-              <a:solidFill>
-                <a:srgbClr val="FABCCF"/>
-              </a:solidFill>
-            </a:endParaRPr>
-          </a:p>
-        </p:txBody>
-      </p:sp>
-      <p:sp>
-        <p:nvSpPr>
-          <p:cNvPr id="10" name="Textfeld 9">
-            <a:extLst>
-              <a:ext uri="{FF2B5EF4-FFF2-40B4-BE49-F238E27FC236}">
-                <a16:creationId xmlns:a16="http://schemas.microsoft.com/office/drawing/2014/main" id="{8A77F318-31B1-26EF-32FC-6C3A9FF3EE2F}"/>
-              </a:ext>
-            </a:extLst>
-          </p:cNvPr>
-          <p:cNvSpPr txBox="1"/>
-          <p:nvPr/>
-        </p:nvSpPr>
-        <p:spPr>
-          <a:xfrm>
-            <a:off x="9602648" y="6283492"/>
-            <a:ext cx="1453018" cy="523220"/>
-          </a:xfrm>
-          <a:prstGeom prst="rect">
-            <a:avLst/>
-          </a:prstGeom>
-          <a:noFill/>
-        </p:spPr>
-        <p:txBody>
-          <a:bodyPr wrap="square">
-            <a:spAutoFit/>
-          </a:bodyPr>
-          <a:lstStyle/>
-          <a:p>
-            <a:pPr algn="r"/>
-            <a:r>
-              <a:rPr lang="de-DE" altLang="ja-JP" sz="2800" b="1">
-                <a:solidFill>
-                  <a:srgbClr val="FABCCF"/>
-                </a:solidFill>
-              </a:rPr>
-              <a:t>2024</a:t>
-            </a:r>
-            <a:endParaRPr lang="en-DE" sz="2800"/>
-          </a:p>
-        </p:txBody>
-      </p:sp>
-      <p:sp>
-        <p:nvSpPr>
           <p:cNvPr id="11" name="Foliennummernplatzhalter 10">
             <a:extLst>
               <a:ext uri="{FF2B5EF4-FFF2-40B4-BE49-F238E27FC236}">
@@ -8641,10 +8952,10 @@
       </p:sp>
       <p:pic>
         <p:nvPicPr>
-          <p:cNvPr id="3" name="Graphic 2">
-            <a:extLst>
-              <a:ext uri="{FF2B5EF4-FFF2-40B4-BE49-F238E27FC236}">
-                <a16:creationId xmlns:a16="http://schemas.microsoft.com/office/drawing/2014/main" id="{DBDFCB48-6DA9-4924-8392-60BB20D46DA8}"/>
+          <p:cNvPr id="2" name="Graphic 1">
+            <a:extLst>
+              <a:ext uri="{FF2B5EF4-FFF2-40B4-BE49-F238E27FC236}">
+                <a16:creationId xmlns:a16="http://schemas.microsoft.com/office/drawing/2014/main" id="{F4781690-0674-433C-A0F2-435915264BEB}"/>
               </a:ext>
             </a:extLst>
           </p:cNvPr>
@@ -8670,14 +8981,55 @@
         </p:blipFill>
         <p:spPr>
           <a:xfrm>
-            <a:off x="10989355" y="5195799"/>
-            <a:ext cx="1048303" cy="1048303"/>
+            <a:off x="10207148" y="5267770"/>
+            <a:ext cx="1781182" cy="1060153"/>
           </a:xfrm>
           <a:prstGeom prst="rect">
             <a:avLst/>
           </a:prstGeom>
         </p:spPr>
       </p:pic>
+      <p:sp>
+        <p:nvSpPr>
+          <p:cNvPr id="7" name="Textfeld 9">
+            <a:extLst>
+              <a:ext uri="{FF2B5EF4-FFF2-40B4-BE49-F238E27FC236}">
+                <a16:creationId xmlns:a16="http://schemas.microsoft.com/office/drawing/2014/main" id="{D6A491A8-8CD6-6B23-3BCD-47C54FBFE4F0}"/>
+              </a:ext>
+            </a:extLst>
+          </p:cNvPr>
+          <p:cNvSpPr txBox="1"/>
+          <p:nvPr/>
+        </p:nvSpPr>
+        <p:spPr>
+          <a:xfrm>
+            <a:off x="9602648" y="6283492"/>
+            <a:ext cx="2589352" cy="461665"/>
+          </a:xfrm>
+          <a:prstGeom prst="rect">
+            <a:avLst/>
+          </a:prstGeom>
+          <a:noFill/>
+        </p:spPr>
+        <p:txBody>
+          <a:bodyPr wrap="square">
+            <a:spAutoFit/>
+          </a:bodyPr>
+          <a:lstStyle/>
+          <a:p>
+            <a:pPr algn="r"/>
+            <a:r>
+              <a:rPr lang="de-DE" altLang="ja-JP" sz="2400" b="1">
+                <a:solidFill>
+                  <a:srgbClr val="FABCCF"/>
+                </a:solidFill>
+              </a:rPr>
+              <a:t>ST. LOUIS 2024</a:t>
+            </a:r>
+            <a:endParaRPr lang="en-DE" sz="2400"/>
+          </a:p>
+        </p:txBody>
+      </p:sp>
     </p:spTree>
     <p:extLst>
       <p:ext uri="{BB962C8B-B14F-4D97-AF65-F5344CB8AC3E}">
@@ -8922,92 +9274,6 @@
       </p:sp>
       <p:sp>
         <p:nvSpPr>
-          <p:cNvPr id="8" name="Textfeld 7">
-            <a:extLst>
-              <a:ext uri="{FF2B5EF4-FFF2-40B4-BE49-F238E27FC236}">
-                <a16:creationId xmlns:a16="http://schemas.microsoft.com/office/drawing/2014/main" id="{2687DB21-E114-1E4F-29AB-B2D599072FFF}"/>
-              </a:ext>
-            </a:extLst>
-          </p:cNvPr>
-          <p:cNvSpPr txBox="1"/>
-          <p:nvPr/>
-        </p:nvSpPr>
-        <p:spPr>
-          <a:xfrm>
-            <a:off x="10835014" y="6180478"/>
-            <a:ext cx="1356986" cy="769441"/>
-          </a:xfrm>
-          <a:prstGeom prst="rect">
-            <a:avLst/>
-          </a:prstGeom>
-          <a:noFill/>
-        </p:spPr>
-        <p:txBody>
-          <a:bodyPr wrap="square" anchor="ctr" anchorCtr="0">
-            <a:spAutoFit/>
-          </a:bodyPr>
-          <a:lstStyle/>
-          <a:p>
-            <a:pPr algn="r"/>
-            <a:r>
-              <a:rPr lang="ja-JP" altLang="en-US" sz="4400" b="1">
-                <a:solidFill>
-                  <a:srgbClr val="FABCCF"/>
-                </a:solidFill>
-              </a:rPr>
-              <a:t>東京</a:t>
-            </a:r>
-            <a:endParaRPr lang="en-DE" sz="4400" b="1">
-              <a:solidFill>
-                <a:srgbClr val="FABCCF"/>
-              </a:solidFill>
-            </a:endParaRPr>
-          </a:p>
-        </p:txBody>
-      </p:sp>
-      <p:sp>
-        <p:nvSpPr>
-          <p:cNvPr id="10" name="Textfeld 9">
-            <a:extLst>
-              <a:ext uri="{FF2B5EF4-FFF2-40B4-BE49-F238E27FC236}">
-                <a16:creationId xmlns:a16="http://schemas.microsoft.com/office/drawing/2014/main" id="{8A77F318-31B1-26EF-32FC-6C3A9FF3EE2F}"/>
-              </a:ext>
-            </a:extLst>
-          </p:cNvPr>
-          <p:cNvSpPr txBox="1"/>
-          <p:nvPr/>
-        </p:nvSpPr>
-        <p:spPr>
-          <a:xfrm>
-            <a:off x="9602648" y="6283492"/>
-            <a:ext cx="1453018" cy="523220"/>
-          </a:xfrm>
-          <a:prstGeom prst="rect">
-            <a:avLst/>
-          </a:prstGeom>
-          <a:noFill/>
-        </p:spPr>
-        <p:txBody>
-          <a:bodyPr wrap="square">
-            <a:spAutoFit/>
-          </a:bodyPr>
-          <a:lstStyle/>
-          <a:p>
-            <a:pPr algn="r"/>
-            <a:r>
-              <a:rPr lang="de-DE" altLang="ja-JP" sz="2800" b="1">
-                <a:solidFill>
-                  <a:srgbClr val="FABCCF"/>
-                </a:solidFill>
-              </a:rPr>
-              <a:t>2024</a:t>
-            </a:r>
-            <a:endParaRPr lang="en-DE" sz="2800"/>
-          </a:p>
-        </p:txBody>
-      </p:sp>
-      <p:sp>
-        <p:nvSpPr>
           <p:cNvPr id="11" name="Foliennummernplatzhalter 10">
             <a:extLst>
               <a:ext uri="{FF2B5EF4-FFF2-40B4-BE49-F238E27FC236}">
@@ -9192,45 +9458,6 @@
           </a:p>
         </p:txBody>
       </p:sp>
-      <p:pic>
-        <p:nvPicPr>
-          <p:cNvPr id="3" name="Graphic 2">
-            <a:extLst>
-              <a:ext uri="{FF2B5EF4-FFF2-40B4-BE49-F238E27FC236}">
-                <a16:creationId xmlns:a16="http://schemas.microsoft.com/office/drawing/2014/main" id="{DBDFCB48-6DA9-4924-8392-60BB20D46DA8}"/>
-              </a:ext>
-            </a:extLst>
-          </p:cNvPr>
-          <p:cNvPicPr>
-            <a:picLocks noChangeAspect="1"/>
-          </p:cNvPicPr>
-          <p:nvPr/>
-        </p:nvPicPr>
-        <p:blipFill>
-          <a:blip r:embed="rId2">
-            <a:extLst>
-              <a:ext uri="{28A0092B-C50C-407E-A947-70E740481C1C}">
-                <a14:useLocalDpi xmlns:a14="http://schemas.microsoft.com/office/drawing/2010/main" val="0"/>
-              </a:ext>
-              <a:ext uri="{96DAC541-7B7A-43D3-8B79-37D633B846F1}">
-                <asvg:svgBlip xmlns:asvg="http://schemas.microsoft.com/office/drawing/2016/SVG/main" r:embed="rId3"/>
-              </a:ext>
-            </a:extLst>
-          </a:blip>
-          <a:stretch>
-            <a:fillRect/>
-          </a:stretch>
-        </p:blipFill>
-        <p:spPr>
-          <a:xfrm>
-            <a:off x="10989355" y="5195799"/>
-            <a:ext cx="1048303" cy="1048303"/>
-          </a:xfrm>
-          <a:prstGeom prst="rect">
-            <a:avLst/>
-          </a:prstGeom>
-        </p:spPr>
-      </p:pic>
       <p:graphicFrame>
         <p:nvGraphicFramePr>
           <p:cNvPr id="9" name="Table 8">
@@ -9742,6 +9969,86 @@
           </a:p>
         </p:txBody>
       </p:sp>
+      <p:pic>
+        <p:nvPicPr>
+          <p:cNvPr id="2" name="Graphic 1">
+            <a:extLst>
+              <a:ext uri="{FF2B5EF4-FFF2-40B4-BE49-F238E27FC236}">
+                <a16:creationId xmlns:a16="http://schemas.microsoft.com/office/drawing/2014/main" id="{CAEB36C0-C428-F361-143F-B9A445D25F66}"/>
+              </a:ext>
+            </a:extLst>
+          </p:cNvPr>
+          <p:cNvPicPr>
+            <a:picLocks noChangeAspect="1"/>
+          </p:cNvPicPr>
+          <p:nvPr/>
+        </p:nvPicPr>
+        <p:blipFill>
+          <a:blip r:embed="rId2">
+            <a:extLst>
+              <a:ext uri="{28A0092B-C50C-407E-A947-70E740481C1C}">
+                <a14:useLocalDpi xmlns:a14="http://schemas.microsoft.com/office/drawing/2010/main" val="0"/>
+              </a:ext>
+              <a:ext uri="{96DAC541-7B7A-43D3-8B79-37D633B846F1}">
+                <asvg:svgBlip xmlns:asvg="http://schemas.microsoft.com/office/drawing/2016/SVG/main" r:embed="rId3"/>
+              </a:ext>
+            </a:extLst>
+          </a:blip>
+          <a:stretch>
+            <a:fillRect/>
+          </a:stretch>
+        </p:blipFill>
+        <p:spPr>
+          <a:xfrm>
+            <a:off x="10207148" y="5267770"/>
+            <a:ext cx="1781182" cy="1060153"/>
+          </a:xfrm>
+          <a:prstGeom prst="rect">
+            <a:avLst/>
+          </a:prstGeom>
+        </p:spPr>
+      </p:pic>
+      <p:sp>
+        <p:nvSpPr>
+          <p:cNvPr id="7" name="Textfeld 9">
+            <a:extLst>
+              <a:ext uri="{FF2B5EF4-FFF2-40B4-BE49-F238E27FC236}">
+                <a16:creationId xmlns:a16="http://schemas.microsoft.com/office/drawing/2014/main" id="{6E9FD980-60A1-2F02-77EB-BDA4251683BE}"/>
+              </a:ext>
+            </a:extLst>
+          </p:cNvPr>
+          <p:cNvSpPr txBox="1"/>
+          <p:nvPr/>
+        </p:nvSpPr>
+        <p:spPr>
+          <a:xfrm>
+            <a:off x="9602648" y="6283492"/>
+            <a:ext cx="2589352" cy="461665"/>
+          </a:xfrm>
+          <a:prstGeom prst="rect">
+            <a:avLst/>
+          </a:prstGeom>
+          <a:noFill/>
+        </p:spPr>
+        <p:txBody>
+          <a:bodyPr wrap="square">
+            <a:spAutoFit/>
+          </a:bodyPr>
+          <a:lstStyle/>
+          <a:p>
+            <a:pPr algn="r"/>
+            <a:r>
+              <a:rPr lang="de-DE" altLang="ja-JP" sz="2400" b="1">
+                <a:solidFill>
+                  <a:srgbClr val="FABCCF"/>
+                </a:solidFill>
+              </a:rPr>
+              <a:t>ST. LOUIS 2024</a:t>
+            </a:r>
+            <a:endParaRPr lang="en-DE" sz="2400"/>
+          </a:p>
+        </p:txBody>
+      </p:sp>
     </p:spTree>
     <p:extLst>
       <p:ext uri="{BB962C8B-B14F-4D97-AF65-F5344CB8AC3E}">
@@ -9986,92 +10293,6 @@
       </p:sp>
       <p:sp>
         <p:nvSpPr>
-          <p:cNvPr id="8" name="Textfeld 7">
-            <a:extLst>
-              <a:ext uri="{FF2B5EF4-FFF2-40B4-BE49-F238E27FC236}">
-                <a16:creationId xmlns:a16="http://schemas.microsoft.com/office/drawing/2014/main" id="{2687DB21-E114-1E4F-29AB-B2D599072FFF}"/>
-              </a:ext>
-            </a:extLst>
-          </p:cNvPr>
-          <p:cNvSpPr txBox="1"/>
-          <p:nvPr/>
-        </p:nvSpPr>
-        <p:spPr>
-          <a:xfrm>
-            <a:off x="10835014" y="6180478"/>
-            <a:ext cx="1356986" cy="769441"/>
-          </a:xfrm>
-          <a:prstGeom prst="rect">
-            <a:avLst/>
-          </a:prstGeom>
-          <a:noFill/>
-        </p:spPr>
-        <p:txBody>
-          <a:bodyPr wrap="square" anchor="ctr" anchorCtr="0">
-            <a:spAutoFit/>
-          </a:bodyPr>
-          <a:lstStyle/>
-          <a:p>
-            <a:pPr algn="r"/>
-            <a:r>
-              <a:rPr lang="ja-JP" altLang="en-US" sz="4400" b="1">
-                <a:solidFill>
-                  <a:srgbClr val="FABCCF"/>
-                </a:solidFill>
-              </a:rPr>
-              <a:t>東京</a:t>
-            </a:r>
-            <a:endParaRPr lang="en-DE" sz="4400" b="1">
-              <a:solidFill>
-                <a:srgbClr val="FABCCF"/>
-              </a:solidFill>
-            </a:endParaRPr>
-          </a:p>
-        </p:txBody>
-      </p:sp>
-      <p:sp>
-        <p:nvSpPr>
-          <p:cNvPr id="10" name="Textfeld 9">
-            <a:extLst>
-              <a:ext uri="{FF2B5EF4-FFF2-40B4-BE49-F238E27FC236}">
-                <a16:creationId xmlns:a16="http://schemas.microsoft.com/office/drawing/2014/main" id="{8A77F318-31B1-26EF-32FC-6C3A9FF3EE2F}"/>
-              </a:ext>
-            </a:extLst>
-          </p:cNvPr>
-          <p:cNvSpPr txBox="1"/>
-          <p:nvPr/>
-        </p:nvSpPr>
-        <p:spPr>
-          <a:xfrm>
-            <a:off x="9602648" y="6283492"/>
-            <a:ext cx="1453018" cy="523220"/>
-          </a:xfrm>
-          <a:prstGeom prst="rect">
-            <a:avLst/>
-          </a:prstGeom>
-          <a:noFill/>
-        </p:spPr>
-        <p:txBody>
-          <a:bodyPr wrap="square">
-            <a:spAutoFit/>
-          </a:bodyPr>
-          <a:lstStyle/>
-          <a:p>
-            <a:pPr algn="r"/>
-            <a:r>
-              <a:rPr lang="de-DE" altLang="ja-JP" sz="2800" b="1">
-                <a:solidFill>
-                  <a:srgbClr val="FABCCF"/>
-                </a:solidFill>
-              </a:rPr>
-              <a:t>2024</a:t>
-            </a:r>
-            <a:endParaRPr lang="en-DE" sz="2800"/>
-          </a:p>
-        </p:txBody>
-      </p:sp>
-      <p:sp>
-        <p:nvSpPr>
           <p:cNvPr id="11" name="Foliennummernplatzhalter 10">
             <a:extLst>
               <a:ext uri="{FF2B5EF4-FFF2-40B4-BE49-F238E27FC236}">
@@ -10256,45 +10477,6 @@
           </a:p>
         </p:txBody>
       </p:sp>
-      <p:pic>
-        <p:nvPicPr>
-          <p:cNvPr id="3" name="Graphic 2">
-            <a:extLst>
-              <a:ext uri="{FF2B5EF4-FFF2-40B4-BE49-F238E27FC236}">
-                <a16:creationId xmlns:a16="http://schemas.microsoft.com/office/drawing/2014/main" id="{DBDFCB48-6DA9-4924-8392-60BB20D46DA8}"/>
-              </a:ext>
-            </a:extLst>
-          </p:cNvPr>
-          <p:cNvPicPr>
-            <a:picLocks noChangeAspect="1"/>
-          </p:cNvPicPr>
-          <p:nvPr/>
-        </p:nvPicPr>
-        <p:blipFill>
-          <a:blip r:embed="rId2">
-            <a:extLst>
-              <a:ext uri="{28A0092B-C50C-407E-A947-70E740481C1C}">
-                <a14:useLocalDpi xmlns:a14="http://schemas.microsoft.com/office/drawing/2010/main" val="0"/>
-              </a:ext>
-              <a:ext uri="{96DAC541-7B7A-43D3-8B79-37D633B846F1}">
-                <asvg:svgBlip xmlns:asvg="http://schemas.microsoft.com/office/drawing/2016/SVG/main" r:embed="rId3"/>
-              </a:ext>
-            </a:extLst>
-          </a:blip>
-          <a:stretch>
-            <a:fillRect/>
-          </a:stretch>
-        </p:blipFill>
-        <p:spPr>
-          <a:xfrm>
-            <a:off x="10989355" y="5195799"/>
-            <a:ext cx="1048303" cy="1048303"/>
-          </a:xfrm>
-          <a:prstGeom prst="rect">
-            <a:avLst/>
-          </a:prstGeom>
-        </p:spPr>
-      </p:pic>
       <p:graphicFrame>
         <p:nvGraphicFramePr>
           <p:cNvPr id="2" name="Table 1">
@@ -11233,92 +11415,6 @@
       </p:sp>
       <p:sp>
         <p:nvSpPr>
-          <p:cNvPr id="8" name="Textfeld 7">
-            <a:extLst>
-              <a:ext uri="{FF2B5EF4-FFF2-40B4-BE49-F238E27FC236}">
-                <a16:creationId xmlns:a16="http://schemas.microsoft.com/office/drawing/2014/main" id="{2687DB21-E114-1E4F-29AB-B2D599072FFF}"/>
-              </a:ext>
-            </a:extLst>
-          </p:cNvPr>
-          <p:cNvSpPr txBox="1"/>
-          <p:nvPr/>
-        </p:nvSpPr>
-        <p:spPr>
-          <a:xfrm>
-            <a:off x="10835014" y="6180478"/>
-            <a:ext cx="1356986" cy="769441"/>
-          </a:xfrm>
-          <a:prstGeom prst="rect">
-            <a:avLst/>
-          </a:prstGeom>
-          <a:noFill/>
-        </p:spPr>
-        <p:txBody>
-          <a:bodyPr wrap="square" anchor="ctr" anchorCtr="0">
-            <a:spAutoFit/>
-          </a:bodyPr>
-          <a:lstStyle/>
-          <a:p>
-            <a:pPr algn="r"/>
-            <a:r>
-              <a:rPr lang="ja-JP" altLang="en-US" sz="4400" b="1">
-                <a:solidFill>
-                  <a:srgbClr val="FABCCF"/>
-                </a:solidFill>
-              </a:rPr>
-              <a:t>東京</a:t>
-            </a:r>
-            <a:endParaRPr lang="en-DE" sz="4400" b="1">
-              <a:solidFill>
-                <a:srgbClr val="FABCCF"/>
-              </a:solidFill>
-            </a:endParaRPr>
-          </a:p>
-        </p:txBody>
-      </p:sp>
-      <p:sp>
-        <p:nvSpPr>
-          <p:cNvPr id="10" name="Textfeld 9">
-            <a:extLst>
-              <a:ext uri="{FF2B5EF4-FFF2-40B4-BE49-F238E27FC236}">
-                <a16:creationId xmlns:a16="http://schemas.microsoft.com/office/drawing/2014/main" id="{8A77F318-31B1-26EF-32FC-6C3A9FF3EE2F}"/>
-              </a:ext>
-            </a:extLst>
-          </p:cNvPr>
-          <p:cNvSpPr txBox="1"/>
-          <p:nvPr/>
-        </p:nvSpPr>
-        <p:spPr>
-          <a:xfrm>
-            <a:off x="9602648" y="6283492"/>
-            <a:ext cx="1453018" cy="523220"/>
-          </a:xfrm>
-          <a:prstGeom prst="rect">
-            <a:avLst/>
-          </a:prstGeom>
-          <a:noFill/>
-        </p:spPr>
-        <p:txBody>
-          <a:bodyPr wrap="square">
-            <a:spAutoFit/>
-          </a:bodyPr>
-          <a:lstStyle/>
-          <a:p>
-            <a:pPr algn="r"/>
-            <a:r>
-              <a:rPr lang="de-DE" altLang="ja-JP" sz="2800" b="1">
-                <a:solidFill>
-                  <a:srgbClr val="FABCCF"/>
-                </a:solidFill>
-              </a:rPr>
-              <a:t>2024</a:t>
-            </a:r>
-            <a:endParaRPr lang="en-DE" sz="2800"/>
-          </a:p>
-        </p:txBody>
-      </p:sp>
-      <p:sp>
-        <p:nvSpPr>
           <p:cNvPr id="11" name="Foliennummernplatzhalter 10">
             <a:extLst>
               <a:ext uri="{FF2B5EF4-FFF2-40B4-BE49-F238E27FC236}">
@@ -12087,10 +12183,10 @@
       </p:sp>
       <p:pic>
         <p:nvPicPr>
-          <p:cNvPr id="3" name="Graphic 2">
-            <a:extLst>
-              <a:ext uri="{FF2B5EF4-FFF2-40B4-BE49-F238E27FC236}">
-                <a16:creationId xmlns:a16="http://schemas.microsoft.com/office/drawing/2014/main" id="{DBDFCB48-6DA9-4924-8392-60BB20D46DA8}"/>
+          <p:cNvPr id="7" name="Graphic 6">
+            <a:extLst>
+              <a:ext uri="{FF2B5EF4-FFF2-40B4-BE49-F238E27FC236}">
+                <a16:creationId xmlns:a16="http://schemas.microsoft.com/office/drawing/2014/main" id="{F3D45197-7032-728C-5753-81CFE1ADA79B}"/>
               </a:ext>
             </a:extLst>
           </p:cNvPr>
@@ -12116,14 +12212,55 @@
         </p:blipFill>
         <p:spPr>
           <a:xfrm>
-            <a:off x="10989355" y="5195799"/>
-            <a:ext cx="1048303" cy="1048303"/>
+            <a:off x="10207148" y="5267770"/>
+            <a:ext cx="1781182" cy="1060153"/>
           </a:xfrm>
           <a:prstGeom prst="rect">
             <a:avLst/>
           </a:prstGeom>
         </p:spPr>
       </p:pic>
+      <p:sp>
+        <p:nvSpPr>
+          <p:cNvPr id="9" name="Textfeld 9">
+            <a:extLst>
+              <a:ext uri="{FF2B5EF4-FFF2-40B4-BE49-F238E27FC236}">
+                <a16:creationId xmlns:a16="http://schemas.microsoft.com/office/drawing/2014/main" id="{E5E36FAA-B2EA-4783-E187-8D6684D78038}"/>
+              </a:ext>
+            </a:extLst>
+          </p:cNvPr>
+          <p:cNvSpPr txBox="1"/>
+          <p:nvPr/>
+        </p:nvSpPr>
+        <p:spPr>
+          <a:xfrm>
+            <a:off x="9602648" y="6283492"/>
+            <a:ext cx="2589352" cy="461665"/>
+          </a:xfrm>
+          <a:prstGeom prst="rect">
+            <a:avLst/>
+          </a:prstGeom>
+          <a:noFill/>
+        </p:spPr>
+        <p:txBody>
+          <a:bodyPr wrap="square">
+            <a:spAutoFit/>
+          </a:bodyPr>
+          <a:lstStyle/>
+          <a:p>
+            <a:pPr algn="r"/>
+            <a:r>
+              <a:rPr lang="de-DE" altLang="ja-JP" sz="2400" b="1">
+                <a:solidFill>
+                  <a:srgbClr val="FABCCF"/>
+                </a:solidFill>
+              </a:rPr>
+              <a:t>ST. LOUIS 2024</a:t>
+            </a:r>
+            <a:endParaRPr lang="en-DE" sz="2400"/>
+          </a:p>
+        </p:txBody>
+      </p:sp>
     </p:spTree>
     <p:extLst>
       <p:ext uri="{BB962C8B-B14F-4D97-AF65-F5344CB8AC3E}">
@@ -12368,92 +12505,6 @@
       </p:sp>
       <p:sp>
         <p:nvSpPr>
-          <p:cNvPr id="8" name="Textfeld 7">
-            <a:extLst>
-              <a:ext uri="{FF2B5EF4-FFF2-40B4-BE49-F238E27FC236}">
-                <a16:creationId xmlns:a16="http://schemas.microsoft.com/office/drawing/2014/main" id="{2687DB21-E114-1E4F-29AB-B2D599072FFF}"/>
-              </a:ext>
-            </a:extLst>
-          </p:cNvPr>
-          <p:cNvSpPr txBox="1"/>
-          <p:nvPr/>
-        </p:nvSpPr>
-        <p:spPr>
-          <a:xfrm>
-            <a:off x="10835014" y="6180478"/>
-            <a:ext cx="1356986" cy="769441"/>
-          </a:xfrm>
-          <a:prstGeom prst="rect">
-            <a:avLst/>
-          </a:prstGeom>
-          <a:noFill/>
-        </p:spPr>
-        <p:txBody>
-          <a:bodyPr wrap="square" anchor="ctr" anchorCtr="0">
-            <a:spAutoFit/>
-          </a:bodyPr>
-          <a:lstStyle/>
-          <a:p>
-            <a:pPr algn="r"/>
-            <a:r>
-              <a:rPr lang="ja-JP" altLang="en-US" sz="4400" b="1">
-                <a:solidFill>
-                  <a:srgbClr val="FABCCF"/>
-                </a:solidFill>
-              </a:rPr>
-              <a:t>東京</a:t>
-            </a:r>
-            <a:endParaRPr lang="en-DE" sz="4400" b="1">
-              <a:solidFill>
-                <a:srgbClr val="FABCCF"/>
-              </a:solidFill>
-            </a:endParaRPr>
-          </a:p>
-        </p:txBody>
-      </p:sp>
-      <p:sp>
-        <p:nvSpPr>
-          <p:cNvPr id="10" name="Textfeld 9">
-            <a:extLst>
-              <a:ext uri="{FF2B5EF4-FFF2-40B4-BE49-F238E27FC236}">
-                <a16:creationId xmlns:a16="http://schemas.microsoft.com/office/drawing/2014/main" id="{8A77F318-31B1-26EF-32FC-6C3A9FF3EE2F}"/>
-              </a:ext>
-            </a:extLst>
-          </p:cNvPr>
-          <p:cNvSpPr txBox="1"/>
-          <p:nvPr/>
-        </p:nvSpPr>
-        <p:spPr>
-          <a:xfrm>
-            <a:off x="9602648" y="6283492"/>
-            <a:ext cx="1453018" cy="523220"/>
-          </a:xfrm>
-          <a:prstGeom prst="rect">
-            <a:avLst/>
-          </a:prstGeom>
-          <a:noFill/>
-        </p:spPr>
-        <p:txBody>
-          <a:bodyPr wrap="square">
-            <a:spAutoFit/>
-          </a:bodyPr>
-          <a:lstStyle/>
-          <a:p>
-            <a:pPr algn="r"/>
-            <a:r>
-              <a:rPr lang="de-DE" altLang="ja-JP" sz="2800" b="1">
-                <a:solidFill>
-                  <a:srgbClr val="FABCCF"/>
-                </a:solidFill>
-              </a:rPr>
-              <a:t>2024</a:t>
-            </a:r>
-            <a:endParaRPr lang="en-DE" sz="2800"/>
-          </a:p>
-        </p:txBody>
-      </p:sp>
-      <p:sp>
-        <p:nvSpPr>
           <p:cNvPr id="11" name="Foliennummernplatzhalter 10">
             <a:extLst>
               <a:ext uri="{FF2B5EF4-FFF2-40B4-BE49-F238E27FC236}">
@@ -12675,19 +12726,16 @@
           <a:p>
             <a:r>
               <a:rPr lang="de-DE" sz="2400"/>
-              <a:t>None. </a:t>
-            </a:r>
-            <a:r>
-              <a:rPr lang="de-DE" sz="2400">
-                <a:solidFill>
-                  <a:schemeClr val="tx1">
-                    <a:lumMod val="50000"/>
-                    <a:lumOff val="50000"/>
-                  </a:schemeClr>
-                </a:solidFill>
-              </a:rPr>
-              <a:t>(extended integer semantics are just fine)</a:t>
-            </a:r>
+              <a:t>Depends on the design (no changes in the current proposal)</a:t>
+            </a:r>
+            <a:endParaRPr lang="de-DE" sz="2400">
+              <a:solidFill>
+                <a:schemeClr val="tx1">
+                  <a:lumMod val="50000"/>
+                  <a:lumOff val="50000"/>
+                </a:schemeClr>
+              </a:solidFill>
+            </a:endParaRPr>
           </a:p>
           <a:p>
             <a:endParaRPr lang="de-DE" sz="2400"/>
@@ -12872,10 +12920,10 @@
       </p:sp>
       <p:pic>
         <p:nvPicPr>
-          <p:cNvPr id="3" name="Graphic 2">
-            <a:extLst>
-              <a:ext uri="{FF2B5EF4-FFF2-40B4-BE49-F238E27FC236}">
-                <a16:creationId xmlns:a16="http://schemas.microsoft.com/office/drawing/2014/main" id="{DBDFCB48-6DA9-4924-8392-60BB20D46DA8}"/>
+          <p:cNvPr id="2" name="Graphic 1">
+            <a:extLst>
+              <a:ext uri="{FF2B5EF4-FFF2-40B4-BE49-F238E27FC236}">
+                <a16:creationId xmlns:a16="http://schemas.microsoft.com/office/drawing/2014/main" id="{067994FE-F890-F388-6E0D-9F46CFE3040B}"/>
               </a:ext>
             </a:extLst>
           </p:cNvPr>
@@ -12901,14 +12949,55 @@
         </p:blipFill>
         <p:spPr>
           <a:xfrm>
-            <a:off x="10989355" y="5195799"/>
-            <a:ext cx="1048303" cy="1048303"/>
+            <a:off x="10207148" y="5267770"/>
+            <a:ext cx="1781182" cy="1060153"/>
           </a:xfrm>
           <a:prstGeom prst="rect">
             <a:avLst/>
           </a:prstGeom>
         </p:spPr>
       </p:pic>
+      <p:sp>
+        <p:nvSpPr>
+          <p:cNvPr id="7" name="Textfeld 9">
+            <a:extLst>
+              <a:ext uri="{FF2B5EF4-FFF2-40B4-BE49-F238E27FC236}">
+                <a16:creationId xmlns:a16="http://schemas.microsoft.com/office/drawing/2014/main" id="{2C7CE0CD-6A38-1267-3E58-3A92C6A5C3A6}"/>
+              </a:ext>
+            </a:extLst>
+          </p:cNvPr>
+          <p:cNvSpPr txBox="1"/>
+          <p:nvPr/>
+        </p:nvSpPr>
+        <p:spPr>
+          <a:xfrm>
+            <a:off x="9602648" y="6283492"/>
+            <a:ext cx="2589352" cy="461665"/>
+          </a:xfrm>
+          <a:prstGeom prst="rect">
+            <a:avLst/>
+          </a:prstGeom>
+          <a:noFill/>
+        </p:spPr>
+        <p:txBody>
+          <a:bodyPr wrap="square">
+            <a:spAutoFit/>
+          </a:bodyPr>
+          <a:lstStyle/>
+          <a:p>
+            <a:pPr algn="r"/>
+            <a:r>
+              <a:rPr lang="de-DE" altLang="ja-JP" sz="2400" b="1">
+                <a:solidFill>
+                  <a:srgbClr val="FABCCF"/>
+                </a:solidFill>
+              </a:rPr>
+              <a:t>ST. LOUIS 2024</a:t>
+            </a:r>
+            <a:endParaRPr lang="en-DE" sz="2400"/>
+          </a:p>
+        </p:txBody>
+      </p:sp>
     </p:spTree>
     <p:extLst>
       <p:ext uri="{BB962C8B-B14F-4D97-AF65-F5344CB8AC3E}">
@@ -13207,92 +13296,6 @@
       </p:sp>
       <p:sp>
         <p:nvSpPr>
-          <p:cNvPr id="8" name="Textfeld 7">
-            <a:extLst>
-              <a:ext uri="{FF2B5EF4-FFF2-40B4-BE49-F238E27FC236}">
-                <a16:creationId xmlns:a16="http://schemas.microsoft.com/office/drawing/2014/main" id="{2687DB21-E114-1E4F-29AB-B2D599072FFF}"/>
-              </a:ext>
-            </a:extLst>
-          </p:cNvPr>
-          <p:cNvSpPr txBox="1"/>
-          <p:nvPr/>
-        </p:nvSpPr>
-        <p:spPr>
-          <a:xfrm>
-            <a:off x="10835014" y="6180478"/>
-            <a:ext cx="1356986" cy="769441"/>
-          </a:xfrm>
-          <a:prstGeom prst="rect">
-            <a:avLst/>
-          </a:prstGeom>
-          <a:noFill/>
-        </p:spPr>
-        <p:txBody>
-          <a:bodyPr wrap="square" anchor="ctr" anchorCtr="0">
-            <a:spAutoFit/>
-          </a:bodyPr>
-          <a:lstStyle/>
-          <a:p>
-            <a:pPr algn="r"/>
-            <a:r>
-              <a:rPr lang="ja-JP" altLang="en-US" sz="4400" b="1">
-                <a:solidFill>
-                  <a:srgbClr val="FABCCF"/>
-                </a:solidFill>
-              </a:rPr>
-              <a:t>東京</a:t>
-            </a:r>
-            <a:endParaRPr lang="en-DE" sz="4400" b="1">
-              <a:solidFill>
-                <a:srgbClr val="FABCCF"/>
-              </a:solidFill>
-            </a:endParaRPr>
-          </a:p>
-        </p:txBody>
-      </p:sp>
-      <p:sp>
-        <p:nvSpPr>
-          <p:cNvPr id="10" name="Textfeld 9">
-            <a:extLst>
-              <a:ext uri="{FF2B5EF4-FFF2-40B4-BE49-F238E27FC236}">
-                <a16:creationId xmlns:a16="http://schemas.microsoft.com/office/drawing/2014/main" id="{8A77F318-31B1-26EF-32FC-6C3A9FF3EE2F}"/>
-              </a:ext>
-            </a:extLst>
-          </p:cNvPr>
-          <p:cNvSpPr txBox="1"/>
-          <p:nvPr/>
-        </p:nvSpPr>
-        <p:spPr>
-          <a:xfrm>
-            <a:off x="9602648" y="6283492"/>
-            <a:ext cx="1453018" cy="523220"/>
-          </a:xfrm>
-          <a:prstGeom prst="rect">
-            <a:avLst/>
-          </a:prstGeom>
-          <a:noFill/>
-        </p:spPr>
-        <p:txBody>
-          <a:bodyPr wrap="square">
-            <a:spAutoFit/>
-          </a:bodyPr>
-          <a:lstStyle/>
-          <a:p>
-            <a:pPr algn="r"/>
-            <a:r>
-              <a:rPr lang="de-DE" altLang="ja-JP" sz="2800" b="1">
-                <a:solidFill>
-                  <a:srgbClr val="FABCCF"/>
-                </a:solidFill>
-              </a:rPr>
-              <a:t>2024</a:t>
-            </a:r>
-            <a:endParaRPr lang="en-DE" sz="2800"/>
-          </a:p>
-        </p:txBody>
-      </p:sp>
-      <p:sp>
-        <p:nvSpPr>
           <p:cNvPr id="11" name="Foliennummernplatzhalter 10">
             <a:extLst>
               <a:ext uri="{FF2B5EF4-FFF2-40B4-BE49-F238E27FC236}">
@@ -14001,10 +14004,10 @@
       </p:sp>
       <p:pic>
         <p:nvPicPr>
-          <p:cNvPr id="3" name="Graphic 2">
-            <a:extLst>
-              <a:ext uri="{FF2B5EF4-FFF2-40B4-BE49-F238E27FC236}">
-                <a16:creationId xmlns:a16="http://schemas.microsoft.com/office/drawing/2014/main" id="{DBDFCB48-6DA9-4924-8392-60BB20D46DA8}"/>
+          <p:cNvPr id="7" name="Graphic 6">
+            <a:extLst>
+              <a:ext uri="{FF2B5EF4-FFF2-40B4-BE49-F238E27FC236}">
+                <a16:creationId xmlns:a16="http://schemas.microsoft.com/office/drawing/2014/main" id="{4B625050-0C65-610C-9BD2-FCD241962D33}"/>
               </a:ext>
             </a:extLst>
           </p:cNvPr>
@@ -14030,14 +14033,55 @@
         </p:blipFill>
         <p:spPr>
           <a:xfrm>
-            <a:off x="10989355" y="5195799"/>
-            <a:ext cx="1048303" cy="1048303"/>
+            <a:off x="10207148" y="5267770"/>
+            <a:ext cx="1781182" cy="1060153"/>
           </a:xfrm>
           <a:prstGeom prst="rect">
             <a:avLst/>
           </a:prstGeom>
         </p:spPr>
       </p:pic>
+      <p:sp>
+        <p:nvSpPr>
+          <p:cNvPr id="9" name="Textfeld 9">
+            <a:extLst>
+              <a:ext uri="{FF2B5EF4-FFF2-40B4-BE49-F238E27FC236}">
+                <a16:creationId xmlns:a16="http://schemas.microsoft.com/office/drawing/2014/main" id="{8C914616-FB3B-F714-18C8-46D4B81F1F5C}"/>
+              </a:ext>
+            </a:extLst>
+          </p:cNvPr>
+          <p:cNvSpPr txBox="1"/>
+          <p:nvPr/>
+        </p:nvSpPr>
+        <p:spPr>
+          <a:xfrm>
+            <a:off x="9602648" y="6283492"/>
+            <a:ext cx="2589352" cy="461665"/>
+          </a:xfrm>
+          <a:prstGeom prst="rect">
+            <a:avLst/>
+          </a:prstGeom>
+          <a:noFill/>
+        </p:spPr>
+        <p:txBody>
+          <a:bodyPr wrap="square">
+            <a:spAutoFit/>
+          </a:bodyPr>
+          <a:lstStyle/>
+          <a:p>
+            <a:pPr algn="r"/>
+            <a:r>
+              <a:rPr lang="de-DE" altLang="ja-JP" sz="2400" b="1">
+                <a:solidFill>
+                  <a:srgbClr val="FABCCF"/>
+                </a:solidFill>
+              </a:rPr>
+              <a:t>ST. LOUIS 2024</a:t>
+            </a:r>
+            <a:endParaRPr lang="en-DE" sz="2400"/>
+          </a:p>
+        </p:txBody>
+      </p:sp>
     </p:spTree>
     <p:extLst>
       <p:ext uri="{BB962C8B-B14F-4D97-AF65-F5344CB8AC3E}">

</xml_diff>